<commit_message>
파티볼 맵 포맷 작성, Stage 1 Remake
</commit_message>
<xml_diff>
--- a/Documents/PartyBall/Project_TheBalls.pptx
+++ b/Documents/PartyBall/Project_TheBalls.pptx
@@ -5,27 +5,28 @@
     <p:sldMasterId id="2147483648" r:id="rId1"/>
   </p:sldMasterIdLst>
   <p:sldIdLst>
-    <p:sldId id="273" r:id="rId2"/>
-    <p:sldId id="274" r:id="rId3"/>
-    <p:sldId id="275" r:id="rId4"/>
-    <p:sldId id="276" r:id="rId5"/>
-    <p:sldId id="277" r:id="rId6"/>
-    <p:sldId id="272" r:id="rId7"/>
-    <p:sldId id="270" r:id="rId8"/>
-    <p:sldId id="271" r:id="rId9"/>
-    <p:sldId id="269" r:id="rId10"/>
-    <p:sldId id="258" r:id="rId11"/>
-    <p:sldId id="256" r:id="rId12"/>
-    <p:sldId id="262" r:id="rId13"/>
-    <p:sldId id="259" r:id="rId14"/>
-    <p:sldId id="261" r:id="rId15"/>
-    <p:sldId id="263" r:id="rId16"/>
-    <p:sldId id="268" r:id="rId17"/>
-    <p:sldId id="265" r:id="rId18"/>
-    <p:sldId id="266" r:id="rId19"/>
-    <p:sldId id="264" r:id="rId20"/>
-    <p:sldId id="267" r:id="rId21"/>
-    <p:sldId id="257" r:id="rId22"/>
+    <p:sldId id="278" r:id="rId2"/>
+    <p:sldId id="273" r:id="rId3"/>
+    <p:sldId id="274" r:id="rId4"/>
+    <p:sldId id="275" r:id="rId5"/>
+    <p:sldId id="276" r:id="rId6"/>
+    <p:sldId id="277" r:id="rId7"/>
+    <p:sldId id="272" r:id="rId8"/>
+    <p:sldId id="270" r:id="rId9"/>
+    <p:sldId id="271" r:id="rId10"/>
+    <p:sldId id="269" r:id="rId11"/>
+    <p:sldId id="258" r:id="rId12"/>
+    <p:sldId id="256" r:id="rId13"/>
+    <p:sldId id="262" r:id="rId14"/>
+    <p:sldId id="259" r:id="rId15"/>
+    <p:sldId id="261" r:id="rId16"/>
+    <p:sldId id="263" r:id="rId17"/>
+    <p:sldId id="268" r:id="rId18"/>
+    <p:sldId id="265" r:id="rId19"/>
+    <p:sldId id="266" r:id="rId20"/>
+    <p:sldId id="264" r:id="rId21"/>
+    <p:sldId id="267" r:id="rId22"/>
+    <p:sldId id="257" r:id="rId23"/>
   </p:sldIdLst>
   <p:sldSz cx="12192000" cy="6858000"/>
   <p:notesSz cx="6858000" cy="9144000"/>
@@ -9760,7 +9761,7 @@
         </p:blipFill>
         <p:spPr>
           <a:xfrm rot="19796575">
-            <a:off x="2161451" y="3658674"/>
+            <a:off x="2226105" y="3557075"/>
             <a:ext cx="4822354" cy="1347333"/>
           </a:xfrm>
           <a:prstGeom prst="rect">
@@ -9798,7 +9799,7 @@
         </p:blipFill>
         <p:spPr>
           <a:xfrm flipH="1">
-            <a:off x="2546113" y="2688335"/>
+            <a:off x="2331114" y="2755333"/>
             <a:ext cx="4822354" cy="1347333"/>
           </a:xfrm>
           <a:prstGeom prst="rect">
@@ -9897,7 +9898,7 @@
     </p:spTree>
     <p:extLst>
       <p:ext uri="{BB962C8B-B14F-4D97-AF65-F5344CB8AC3E}">
-        <p14:creationId xmlns:p14="http://schemas.microsoft.com/office/powerpoint/2010/main" val="4174163929"/>
+        <p14:creationId xmlns:p14="http://schemas.microsoft.com/office/powerpoint/2010/main" val="2410359679"/>
       </p:ext>
     </p:extLst>
   </p:cSld>
@@ -9908,6 +9909,445 @@
 </file>
 
 <file path=ppt/slides/slide10.xml><?xml version="1.0" encoding="utf-8"?>
+<p:sld xmlns:a="http://schemas.openxmlformats.org/drawingml/2006/main" xmlns:r="http://schemas.openxmlformats.org/officeDocument/2006/relationships" xmlns:p="http://schemas.openxmlformats.org/presentationml/2006/main">
+  <p:cSld>
+    <p:spTree>
+      <p:nvGrpSpPr>
+        <p:cNvPr id="1" name=""/>
+        <p:cNvGrpSpPr/>
+        <p:nvPr/>
+      </p:nvGrpSpPr>
+      <p:grpSpPr>
+        <a:xfrm>
+          <a:off x="0" y="0"/>
+          <a:ext cx="0" cy="0"/>
+          <a:chOff x="0" y="0"/>
+          <a:chExt cx="0" cy="0"/>
+        </a:xfrm>
+      </p:grpSpPr>
+      <p:grpSp>
+        <p:nvGrpSpPr>
+          <p:cNvPr id="27" name="그룹 26">
+            <a:extLst>
+              <a:ext uri="{FF2B5EF4-FFF2-40B4-BE49-F238E27FC236}">
+                <a16:creationId xmlns:a16="http://schemas.microsoft.com/office/drawing/2014/main" id="{F0EBB88B-A95A-463A-9125-269913217D3E}"/>
+              </a:ext>
+            </a:extLst>
+          </p:cNvPr>
+          <p:cNvGrpSpPr/>
+          <p:nvPr/>
+        </p:nvGrpSpPr>
+        <p:grpSpPr>
+          <a:xfrm>
+            <a:off x="2294983" y="327231"/>
+            <a:ext cx="6723078" cy="3298971"/>
+            <a:chOff x="2465313" y="67113"/>
+            <a:chExt cx="6723078" cy="3298971"/>
+          </a:xfrm>
+        </p:grpSpPr>
+        <p:grpSp>
+          <p:nvGrpSpPr>
+            <p:cNvPr id="28" name="그룹 27">
+              <a:extLst>
+                <a:ext uri="{FF2B5EF4-FFF2-40B4-BE49-F238E27FC236}">
+                  <a16:creationId xmlns:a16="http://schemas.microsoft.com/office/drawing/2014/main" id="{197D83E5-C78D-4159-8E08-C579ED75DD21}"/>
+                </a:ext>
+              </a:extLst>
+            </p:cNvPr>
+            <p:cNvGrpSpPr/>
+            <p:nvPr/>
+          </p:nvGrpSpPr>
+          <p:grpSpPr>
+            <a:xfrm>
+              <a:off x="2465313" y="67113"/>
+              <a:ext cx="6723078" cy="3298971"/>
+              <a:chOff x="2456924" y="1"/>
+              <a:chExt cx="6723078" cy="3298971"/>
+            </a:xfrm>
+          </p:grpSpPr>
+          <p:sp>
+            <p:nvSpPr>
+              <p:cNvPr id="31" name="사각형: 둥근 모서리 30">
+                <a:extLst>
+                  <a:ext uri="{FF2B5EF4-FFF2-40B4-BE49-F238E27FC236}">
+                    <a16:creationId xmlns:a16="http://schemas.microsoft.com/office/drawing/2014/main" id="{A452F71E-D4A8-4511-B35F-3B6267A09604}"/>
+                  </a:ext>
+                </a:extLst>
+              </p:cNvPr>
+              <p:cNvSpPr/>
+              <p:nvPr/>
+            </p:nvSpPr>
+            <p:spPr>
+              <a:xfrm>
+                <a:off x="5881031" y="1"/>
+                <a:ext cx="3298971" cy="3298971"/>
+              </a:xfrm>
+              <a:prstGeom prst="roundRect">
+                <a:avLst>
+                  <a:gd name="adj" fmla="val 0"/>
+                </a:avLst>
+              </a:prstGeom>
+              <a:noFill/>
+              <a:ln>
+                <a:solidFill>
+                  <a:schemeClr val="tx1"/>
+                </a:solidFill>
+              </a:ln>
+            </p:spPr>
+            <p:style>
+              <a:lnRef idx="2">
+                <a:schemeClr val="accent1">
+                  <a:shade val="50000"/>
+                </a:schemeClr>
+              </a:lnRef>
+              <a:fillRef idx="1">
+                <a:schemeClr val="accent1"/>
+              </a:fillRef>
+              <a:effectRef idx="0">
+                <a:schemeClr val="accent1"/>
+              </a:effectRef>
+              <a:fontRef idx="minor">
+                <a:schemeClr val="lt1"/>
+              </a:fontRef>
+            </p:style>
+            <p:txBody>
+              <a:bodyPr rtlCol="0" anchor="ctr"/>
+              <a:lstStyle/>
+              <a:p>
+                <a:pPr algn="ctr"/>
+                <a:endParaRPr lang="ko-KR" altLang="en-US" dirty="0"/>
+              </a:p>
+            </p:txBody>
+          </p:sp>
+          <p:sp>
+            <p:nvSpPr>
+              <p:cNvPr id="32" name="사각형: 둥근 모서리 31">
+                <a:extLst>
+                  <a:ext uri="{FF2B5EF4-FFF2-40B4-BE49-F238E27FC236}">
+                    <a16:creationId xmlns:a16="http://schemas.microsoft.com/office/drawing/2014/main" id="{28AA6987-18D0-4301-A7F7-D3EA48FEA08E}"/>
+                  </a:ext>
+                </a:extLst>
+              </p:cNvPr>
+              <p:cNvSpPr/>
+              <p:nvPr/>
+            </p:nvSpPr>
+            <p:spPr>
+              <a:xfrm>
+                <a:off x="2456924" y="1"/>
+                <a:ext cx="3298971" cy="3298971"/>
+              </a:xfrm>
+              <a:prstGeom prst="roundRect">
+                <a:avLst>
+                  <a:gd name="adj" fmla="val 0"/>
+                </a:avLst>
+              </a:prstGeom>
+              <a:noFill/>
+              <a:ln>
+                <a:solidFill>
+                  <a:schemeClr val="tx1"/>
+                </a:solidFill>
+              </a:ln>
+            </p:spPr>
+            <p:style>
+              <a:lnRef idx="2">
+                <a:schemeClr val="accent1">
+                  <a:shade val="50000"/>
+                </a:schemeClr>
+              </a:lnRef>
+              <a:fillRef idx="1">
+                <a:schemeClr val="accent1"/>
+              </a:fillRef>
+              <a:effectRef idx="0">
+                <a:schemeClr val="accent1"/>
+              </a:effectRef>
+              <a:fontRef idx="minor">
+                <a:schemeClr val="lt1"/>
+              </a:fontRef>
+            </p:style>
+            <p:txBody>
+              <a:bodyPr rtlCol="0" anchor="ctr"/>
+              <a:lstStyle/>
+              <a:p>
+                <a:pPr algn="ctr"/>
+                <a:endParaRPr lang="ko-KR" altLang="en-US" dirty="0"/>
+              </a:p>
+            </p:txBody>
+          </p:sp>
+          <p:sp>
+            <p:nvSpPr>
+              <p:cNvPr id="33" name="타원 32">
+                <a:extLst>
+                  <a:ext uri="{FF2B5EF4-FFF2-40B4-BE49-F238E27FC236}">
+                    <a16:creationId xmlns:a16="http://schemas.microsoft.com/office/drawing/2014/main" id="{1AEE5C8A-BDCE-4B8B-B0BA-F8D5ECF20E30}"/>
+                  </a:ext>
+                </a:extLst>
+              </p:cNvPr>
+              <p:cNvSpPr/>
+              <p:nvPr/>
+            </p:nvSpPr>
+            <p:spPr>
+              <a:xfrm>
+                <a:off x="2618065" y="2597791"/>
+                <a:ext cx="578840" cy="578840"/>
+              </a:xfrm>
+              <a:prstGeom prst="ellipse">
+                <a:avLst/>
+              </a:prstGeom>
+              <a:solidFill>
+                <a:schemeClr val="tx1"/>
+              </a:solidFill>
+              <a:ln>
+                <a:solidFill>
+                  <a:schemeClr val="tx1"/>
+                </a:solidFill>
+              </a:ln>
+            </p:spPr>
+            <p:style>
+              <a:lnRef idx="2">
+                <a:schemeClr val="accent1">
+                  <a:shade val="50000"/>
+                </a:schemeClr>
+              </a:lnRef>
+              <a:fillRef idx="1">
+                <a:schemeClr val="accent1"/>
+              </a:fillRef>
+              <a:effectRef idx="0">
+                <a:schemeClr val="accent1"/>
+              </a:effectRef>
+              <a:fontRef idx="minor">
+                <a:schemeClr val="lt1"/>
+              </a:fontRef>
+            </p:style>
+            <p:txBody>
+              <a:bodyPr rtlCol="0" anchor="ctr"/>
+              <a:lstStyle/>
+              <a:p>
+                <a:pPr algn="ctr"/>
+                <a:endParaRPr lang="ko-KR" altLang="en-US"/>
+              </a:p>
+            </p:txBody>
+          </p:sp>
+          <p:sp>
+            <p:nvSpPr>
+              <p:cNvPr id="34" name="타원 33">
+                <a:extLst>
+                  <a:ext uri="{FF2B5EF4-FFF2-40B4-BE49-F238E27FC236}">
+                    <a16:creationId xmlns:a16="http://schemas.microsoft.com/office/drawing/2014/main" id="{DAC31FC5-16FC-4FB3-832D-3F9860AF8C4B}"/>
+                  </a:ext>
+                </a:extLst>
+              </p:cNvPr>
+              <p:cNvSpPr/>
+              <p:nvPr/>
+            </p:nvSpPr>
+            <p:spPr>
+              <a:xfrm>
+                <a:off x="6096000" y="2597791"/>
+                <a:ext cx="578840" cy="578840"/>
+              </a:xfrm>
+              <a:prstGeom prst="ellipse">
+                <a:avLst/>
+              </a:prstGeom>
+              <a:solidFill>
+                <a:schemeClr val="tx1"/>
+              </a:solidFill>
+              <a:ln>
+                <a:solidFill>
+                  <a:schemeClr val="tx1"/>
+                </a:solidFill>
+              </a:ln>
+            </p:spPr>
+            <p:style>
+              <a:lnRef idx="2">
+                <a:schemeClr val="accent1">
+                  <a:shade val="50000"/>
+                </a:schemeClr>
+              </a:lnRef>
+              <a:fillRef idx="1">
+                <a:schemeClr val="accent1"/>
+              </a:fillRef>
+              <a:effectRef idx="0">
+                <a:schemeClr val="accent1"/>
+              </a:effectRef>
+              <a:fontRef idx="minor">
+                <a:schemeClr val="lt1"/>
+              </a:fontRef>
+            </p:style>
+            <p:txBody>
+              <a:bodyPr rtlCol="0" anchor="ctr"/>
+              <a:lstStyle/>
+              <a:p>
+                <a:pPr algn="ctr"/>
+                <a:endParaRPr lang="ko-KR" altLang="en-US"/>
+              </a:p>
+            </p:txBody>
+          </p:sp>
+        </p:grpSp>
+        <p:pic>
+          <p:nvPicPr>
+            <p:cNvPr id="29" name="그림 28">
+              <a:extLst>
+                <a:ext uri="{FF2B5EF4-FFF2-40B4-BE49-F238E27FC236}">
+                  <a16:creationId xmlns:a16="http://schemas.microsoft.com/office/drawing/2014/main" id="{768F443E-97DE-44D4-AFC3-0D9913956B70}"/>
+                </a:ext>
+              </a:extLst>
+            </p:cNvPr>
+            <p:cNvPicPr>
+              <a:picLocks noChangeAspect="1"/>
+            </p:cNvPicPr>
+            <p:nvPr/>
+          </p:nvPicPr>
+          <p:blipFill rotWithShape="1">
+            <a:blip r:embed="rId2"/>
+            <a:srcRect l="48567"/>
+            <a:stretch/>
+          </p:blipFill>
+          <p:spPr>
+            <a:xfrm>
+              <a:off x="2465313" y="1161814"/>
+              <a:ext cx="200682" cy="1109568"/>
+            </a:xfrm>
+            <a:prstGeom prst="rect">
+              <a:avLst/>
+            </a:prstGeom>
+          </p:spPr>
+        </p:pic>
+        <p:pic>
+          <p:nvPicPr>
+            <p:cNvPr id="30" name="그림 29">
+              <a:extLst>
+                <a:ext uri="{FF2B5EF4-FFF2-40B4-BE49-F238E27FC236}">
+                  <a16:creationId xmlns:a16="http://schemas.microsoft.com/office/drawing/2014/main" id="{DF0DC684-7412-41B8-9899-20AB36A11B9D}"/>
+                </a:ext>
+              </a:extLst>
+            </p:cNvPr>
+            <p:cNvPicPr>
+              <a:picLocks noChangeAspect="1"/>
+            </p:cNvPicPr>
+            <p:nvPr/>
+          </p:nvPicPr>
+          <p:blipFill rotWithShape="1">
+            <a:blip r:embed="rId2"/>
+            <a:srcRect l="48567"/>
+            <a:stretch/>
+          </p:blipFill>
+          <p:spPr>
+            <a:xfrm rot="10800000">
+              <a:off x="8987709" y="1161814"/>
+              <a:ext cx="200682" cy="1109568"/>
+            </a:xfrm>
+            <a:prstGeom prst="rect">
+              <a:avLst/>
+            </a:prstGeom>
+          </p:spPr>
+        </p:pic>
+      </p:grpSp>
+      <p:grpSp>
+        <p:nvGrpSpPr>
+          <p:cNvPr id="35" name="그룹 34">
+            <a:extLst>
+              <a:ext uri="{FF2B5EF4-FFF2-40B4-BE49-F238E27FC236}">
+                <a16:creationId xmlns:a16="http://schemas.microsoft.com/office/drawing/2014/main" id="{948FB134-BC2C-4E67-B1F0-ADF0F290D578}"/>
+              </a:ext>
+            </a:extLst>
+          </p:cNvPr>
+          <p:cNvGrpSpPr/>
+          <p:nvPr/>
+        </p:nvGrpSpPr>
+        <p:grpSpPr>
+          <a:xfrm>
+            <a:off x="3181255" y="4468243"/>
+            <a:ext cx="4825397" cy="1346032"/>
+            <a:chOff x="3683301" y="2755984"/>
+            <a:chExt cx="4825397" cy="1346032"/>
+          </a:xfrm>
+        </p:grpSpPr>
+        <p:pic>
+          <p:nvPicPr>
+            <p:cNvPr id="36" name="그림 35">
+              <a:extLst>
+                <a:ext uri="{FF2B5EF4-FFF2-40B4-BE49-F238E27FC236}">
+                  <a16:creationId xmlns:a16="http://schemas.microsoft.com/office/drawing/2014/main" id="{39FBB44F-2F07-423A-B117-AE46FEB592C9}"/>
+                </a:ext>
+              </a:extLst>
+            </p:cNvPr>
+            <p:cNvPicPr>
+              <a:picLocks noChangeAspect="1"/>
+            </p:cNvPicPr>
+            <p:nvPr/>
+          </p:nvPicPr>
+          <p:blipFill>
+            <a:blip r:embed="rId3">
+              <a:extLst>
+                <a:ext uri="{28A0092B-C50C-407E-A947-70E740481C1C}">
+                  <a14:useLocalDpi xmlns:a14="http://schemas.microsoft.com/office/drawing/2010/main" val="0"/>
+                </a:ext>
+              </a:extLst>
+            </a:blip>
+            <a:stretch>
+              <a:fillRect/>
+            </a:stretch>
+          </p:blipFill>
+          <p:spPr>
+            <a:xfrm>
+              <a:off x="3683301" y="2755984"/>
+              <a:ext cx="4825397" cy="1346032"/>
+            </a:xfrm>
+            <a:prstGeom prst="rect">
+              <a:avLst/>
+            </a:prstGeom>
+          </p:spPr>
+        </p:pic>
+        <p:pic>
+          <p:nvPicPr>
+            <p:cNvPr id="37" name="그림 36">
+              <a:extLst>
+                <a:ext uri="{FF2B5EF4-FFF2-40B4-BE49-F238E27FC236}">
+                  <a16:creationId xmlns:a16="http://schemas.microsoft.com/office/drawing/2014/main" id="{2920E4A2-967B-4831-B3A4-47119C4F11DF}"/>
+                </a:ext>
+              </a:extLst>
+            </p:cNvPr>
+            <p:cNvPicPr>
+              <a:picLocks noChangeAspect="1"/>
+            </p:cNvPicPr>
+            <p:nvPr/>
+          </p:nvPicPr>
+          <p:blipFill>
+            <a:blip r:embed="rId4">
+              <a:extLst>
+                <a:ext uri="{28A0092B-C50C-407E-A947-70E740481C1C}">
+                  <a14:useLocalDpi xmlns:a14="http://schemas.microsoft.com/office/drawing/2010/main" val="0"/>
+                </a:ext>
+              </a:extLst>
+            </a:blip>
+            <a:stretch>
+              <a:fillRect/>
+            </a:stretch>
+          </p:blipFill>
+          <p:spPr>
+            <a:xfrm>
+              <a:off x="3683301" y="2755984"/>
+              <a:ext cx="4825397" cy="1346032"/>
+            </a:xfrm>
+            <a:prstGeom prst="rect">
+              <a:avLst/>
+            </a:prstGeom>
+          </p:spPr>
+        </p:pic>
+      </p:grpSp>
+    </p:spTree>
+    <p:extLst>
+      <p:ext uri="{BB962C8B-B14F-4D97-AF65-F5344CB8AC3E}">
+        <p14:creationId xmlns:p14="http://schemas.microsoft.com/office/powerpoint/2010/main" val="1734364095"/>
+      </p:ext>
+    </p:extLst>
+  </p:cSld>
+  <p:clrMapOvr>
+    <a:masterClrMapping/>
+  </p:clrMapOvr>
+</p:sld>
+</file>
+
+<file path=ppt/slides/slide11.xml><?xml version="1.0" encoding="utf-8"?>
 <p:sld xmlns:a="http://schemas.openxmlformats.org/drawingml/2006/main" xmlns:r="http://schemas.openxmlformats.org/officeDocument/2006/relationships" xmlns:p="http://schemas.openxmlformats.org/presentationml/2006/main">
   <p:cSld>
     <p:spTree>
@@ -10007,7 +10447,7 @@
 </p:sld>
 </file>
 
-<file path=ppt/slides/slide11.xml><?xml version="1.0" encoding="utf-8"?>
+<file path=ppt/slides/slide12.xml><?xml version="1.0" encoding="utf-8"?>
 <p:sld xmlns:a="http://schemas.openxmlformats.org/drawingml/2006/main" xmlns:r="http://schemas.openxmlformats.org/officeDocument/2006/relationships" xmlns:p="http://schemas.openxmlformats.org/presentationml/2006/main">
   <p:cSld>
     <p:spTree>
@@ -10810,7 +11250,7 @@
 </p:sld>
 </file>
 
-<file path=ppt/slides/slide12.xml><?xml version="1.0" encoding="utf-8"?>
+<file path=ppt/slides/slide13.xml><?xml version="1.0" encoding="utf-8"?>
 <p:sld xmlns:a="http://schemas.openxmlformats.org/drawingml/2006/main" xmlns:r="http://schemas.openxmlformats.org/officeDocument/2006/relationships" xmlns:p="http://schemas.openxmlformats.org/presentationml/2006/main">
   <p:cSld>
     <p:spTree>
@@ -11627,7 +12067,7 @@
 </p:sld>
 </file>
 
-<file path=ppt/slides/slide13.xml><?xml version="1.0" encoding="utf-8"?>
+<file path=ppt/slides/slide14.xml><?xml version="1.0" encoding="utf-8"?>
 <p:sld xmlns:a="http://schemas.openxmlformats.org/drawingml/2006/main" xmlns:r="http://schemas.openxmlformats.org/officeDocument/2006/relationships" xmlns:p="http://schemas.openxmlformats.org/presentationml/2006/main">
   <p:cSld>
     <p:spTree>
@@ -13432,7 +13872,7 @@
 </p:sld>
 </file>
 
-<file path=ppt/slides/slide14.xml><?xml version="1.0" encoding="utf-8"?>
+<file path=ppt/slides/slide15.xml><?xml version="1.0" encoding="utf-8"?>
 <p:sld xmlns:a="http://schemas.openxmlformats.org/drawingml/2006/main" xmlns:r="http://schemas.openxmlformats.org/officeDocument/2006/relationships" xmlns:p="http://schemas.openxmlformats.org/presentationml/2006/main">
   <p:cSld>
     <p:spTree>
@@ -15247,7 +15687,7 @@
 </p:sld>
 </file>
 
-<file path=ppt/slides/slide15.xml><?xml version="1.0" encoding="utf-8"?>
+<file path=ppt/slides/slide16.xml><?xml version="1.0" encoding="utf-8"?>
 <p:sld xmlns:a="http://schemas.openxmlformats.org/drawingml/2006/main" xmlns:r="http://schemas.openxmlformats.org/officeDocument/2006/relationships" xmlns:p="http://schemas.openxmlformats.org/presentationml/2006/main">
   <p:cSld>
     <p:spTree>
@@ -15849,7 +16289,7 @@
 </p:sld>
 </file>
 
-<file path=ppt/slides/slide16.xml><?xml version="1.0" encoding="utf-8"?>
+<file path=ppt/slides/slide17.xml><?xml version="1.0" encoding="utf-8"?>
 <p:sld xmlns:a="http://schemas.openxmlformats.org/drawingml/2006/main" xmlns:r="http://schemas.openxmlformats.org/officeDocument/2006/relationships" xmlns:p="http://schemas.openxmlformats.org/presentationml/2006/main">
   <p:cSld>
     <p:spTree>
@@ -16177,7 +16617,7 @@
 </p:sld>
 </file>
 
-<file path=ppt/slides/slide17.xml><?xml version="1.0" encoding="utf-8"?>
+<file path=ppt/slides/slide18.xml><?xml version="1.0" encoding="utf-8"?>
 <p:sld xmlns:a="http://schemas.openxmlformats.org/drawingml/2006/main" xmlns:r="http://schemas.openxmlformats.org/officeDocument/2006/relationships" xmlns:p="http://schemas.openxmlformats.org/presentationml/2006/main">
   <p:cSld>
     <p:spTree>
@@ -16993,7 +17433,7 @@
 </p:sld>
 </file>
 
-<file path=ppt/slides/slide18.xml><?xml version="1.0" encoding="utf-8"?>
+<file path=ppt/slides/slide19.xml><?xml version="1.0" encoding="utf-8"?>
 <p:sld xmlns:a="http://schemas.openxmlformats.org/drawingml/2006/main" xmlns:r="http://schemas.openxmlformats.org/officeDocument/2006/relationships" xmlns:p="http://schemas.openxmlformats.org/presentationml/2006/main">
   <p:cSld>
     <p:spTree>
@@ -17136,7 +17576,231 @@
 </p:sld>
 </file>
 
-<file path=ppt/slides/slide19.xml><?xml version="1.0" encoding="utf-8"?>
+<file path=ppt/slides/slide2.xml><?xml version="1.0" encoding="utf-8"?>
+<p:sld xmlns:a="http://schemas.openxmlformats.org/drawingml/2006/main" xmlns:r="http://schemas.openxmlformats.org/officeDocument/2006/relationships" xmlns:p="http://schemas.openxmlformats.org/presentationml/2006/main">
+  <p:cSld>
+    <p:spTree>
+      <p:nvGrpSpPr>
+        <p:cNvPr id="1" name=""/>
+        <p:cNvGrpSpPr/>
+        <p:nvPr/>
+      </p:nvGrpSpPr>
+      <p:grpSpPr>
+        <a:xfrm>
+          <a:off x="0" y="0"/>
+          <a:ext cx="0" cy="0"/>
+          <a:chOff x="0" y="0"/>
+          <a:chExt cx="0" cy="0"/>
+        </a:xfrm>
+      </p:grpSpPr>
+      <p:pic>
+        <p:nvPicPr>
+          <p:cNvPr id="4" name="그림 3">
+            <a:extLst>
+              <a:ext uri="{FF2B5EF4-FFF2-40B4-BE49-F238E27FC236}">
+                <a16:creationId xmlns:a16="http://schemas.microsoft.com/office/drawing/2014/main" id="{D0B419ED-8DBD-4027-A732-89F51DF0F841}"/>
+              </a:ext>
+            </a:extLst>
+          </p:cNvPr>
+          <p:cNvPicPr>
+            <a:picLocks noChangeAspect="1"/>
+          </p:cNvPicPr>
+          <p:nvPr/>
+        </p:nvPicPr>
+        <p:blipFill>
+          <a:blip r:embed="rId2"/>
+          <a:stretch>
+            <a:fillRect/>
+          </a:stretch>
+        </p:blipFill>
+        <p:spPr>
+          <a:xfrm>
+            <a:off x="2724150" y="1771650"/>
+            <a:ext cx="6743700" cy="3314700"/>
+          </a:xfrm>
+          <a:prstGeom prst="rect">
+            <a:avLst/>
+          </a:prstGeom>
+        </p:spPr>
+      </p:pic>
+      <p:pic>
+        <p:nvPicPr>
+          <p:cNvPr id="5" name="그림 4">
+            <a:extLst>
+              <a:ext uri="{FF2B5EF4-FFF2-40B4-BE49-F238E27FC236}">
+                <a16:creationId xmlns:a16="http://schemas.microsoft.com/office/drawing/2014/main" id="{141377A7-75B2-4188-9C25-0A46CB0A212D}"/>
+              </a:ext>
+            </a:extLst>
+          </p:cNvPr>
+          <p:cNvPicPr>
+            <a:picLocks noChangeAspect="1"/>
+          </p:cNvPicPr>
+          <p:nvPr/>
+        </p:nvPicPr>
+        <p:blipFill>
+          <a:blip r:embed="rId3">
+            <a:duotone>
+              <a:prstClr val="black"/>
+              <a:schemeClr val="accent1">
+                <a:tint val="45000"/>
+                <a:satMod val="400000"/>
+              </a:schemeClr>
+            </a:duotone>
+          </a:blip>
+          <a:stretch>
+            <a:fillRect/>
+          </a:stretch>
+        </p:blipFill>
+        <p:spPr>
+          <a:xfrm rot="19796575">
+            <a:off x="2161451" y="3658674"/>
+            <a:ext cx="4822354" cy="1347333"/>
+          </a:xfrm>
+          <a:prstGeom prst="rect">
+            <a:avLst/>
+          </a:prstGeom>
+        </p:spPr>
+      </p:pic>
+      <p:pic>
+        <p:nvPicPr>
+          <p:cNvPr id="6" name="그림 5">
+            <a:extLst>
+              <a:ext uri="{FF2B5EF4-FFF2-40B4-BE49-F238E27FC236}">
+                <a16:creationId xmlns:a16="http://schemas.microsoft.com/office/drawing/2014/main" id="{4E945025-5B04-4707-9FB7-A32DAE8AE3E3}"/>
+              </a:ext>
+            </a:extLst>
+          </p:cNvPr>
+          <p:cNvPicPr>
+            <a:picLocks noChangeAspect="1"/>
+          </p:cNvPicPr>
+          <p:nvPr/>
+        </p:nvPicPr>
+        <p:blipFill>
+          <a:blip r:embed="rId3">
+            <a:duotone>
+              <a:prstClr val="black"/>
+              <a:schemeClr val="accent2">
+                <a:tint val="45000"/>
+                <a:satMod val="400000"/>
+              </a:schemeClr>
+            </a:duotone>
+          </a:blip>
+          <a:stretch>
+            <a:fillRect/>
+          </a:stretch>
+        </p:blipFill>
+        <p:spPr>
+          <a:xfrm flipH="1">
+            <a:off x="2546113" y="2688335"/>
+            <a:ext cx="4822354" cy="1347333"/>
+          </a:xfrm>
+          <a:prstGeom prst="rect">
+            <a:avLst/>
+          </a:prstGeom>
+        </p:spPr>
+      </p:pic>
+      <p:pic>
+        <p:nvPicPr>
+          <p:cNvPr id="7" name="그림 6">
+            <a:extLst>
+              <a:ext uri="{FF2B5EF4-FFF2-40B4-BE49-F238E27FC236}">
+                <a16:creationId xmlns:a16="http://schemas.microsoft.com/office/drawing/2014/main" id="{1C104CD9-F1D7-4684-B83C-D347F7966A99}"/>
+              </a:ext>
+            </a:extLst>
+          </p:cNvPr>
+          <p:cNvPicPr>
+            <a:picLocks noChangeAspect="1"/>
+          </p:cNvPicPr>
+          <p:nvPr/>
+        </p:nvPicPr>
+        <p:blipFill>
+          <a:blip r:embed="rId3">
+            <a:duotone>
+              <a:prstClr val="black"/>
+              <a:schemeClr val="accent4">
+                <a:tint val="45000"/>
+                <a:satMod val="400000"/>
+              </a:schemeClr>
+            </a:duotone>
+          </a:blip>
+          <a:stretch>
+            <a:fillRect/>
+          </a:stretch>
+        </p:blipFill>
+        <p:spPr>
+          <a:xfrm rot="10800000">
+            <a:off x="9780823" y="5071625"/>
+            <a:ext cx="4822354" cy="1347333"/>
+          </a:xfrm>
+          <a:prstGeom prst="rect">
+            <a:avLst/>
+          </a:prstGeom>
+        </p:spPr>
+      </p:pic>
+      <p:sp>
+        <p:nvSpPr>
+          <p:cNvPr id="8" name="사각형: 둥근 모서리 7">
+            <a:extLst>
+              <a:ext uri="{FF2B5EF4-FFF2-40B4-BE49-F238E27FC236}">
+                <a16:creationId xmlns:a16="http://schemas.microsoft.com/office/drawing/2014/main" id="{994893E9-9AC6-4B39-8C31-992CC5279E7A}"/>
+              </a:ext>
+            </a:extLst>
+          </p:cNvPr>
+          <p:cNvSpPr/>
+          <p:nvPr/>
+        </p:nvSpPr>
+        <p:spPr>
+          <a:xfrm>
+            <a:off x="332509" y="129309"/>
+            <a:ext cx="3537527" cy="471608"/>
+          </a:xfrm>
+          <a:prstGeom prst="roundRect">
+            <a:avLst/>
+          </a:prstGeom>
+        </p:spPr>
+        <p:style>
+          <a:lnRef idx="2">
+            <a:schemeClr val="accent1">
+              <a:shade val="50000"/>
+            </a:schemeClr>
+          </a:lnRef>
+          <a:fillRef idx="1">
+            <a:schemeClr val="accent1"/>
+          </a:fillRef>
+          <a:effectRef idx="0">
+            <a:schemeClr val="accent1"/>
+          </a:effectRef>
+          <a:fontRef idx="minor">
+            <a:schemeClr val="lt1"/>
+          </a:fontRef>
+        </p:style>
+        <p:txBody>
+          <a:bodyPr rtlCol="0" anchor="ctr"/>
+          <a:lstStyle/>
+          <a:p>
+            <a:pPr algn="ctr"/>
+            <a:r>
+              <a:rPr lang="en-US" altLang="ko-KR" dirty="0"/>
+              <a:t>Stage 1</a:t>
+            </a:r>
+            <a:endParaRPr lang="ko-KR" altLang="en-US" dirty="0"/>
+          </a:p>
+        </p:txBody>
+      </p:sp>
+    </p:spTree>
+    <p:extLst>
+      <p:ext uri="{BB962C8B-B14F-4D97-AF65-F5344CB8AC3E}">
+        <p14:creationId xmlns:p14="http://schemas.microsoft.com/office/powerpoint/2010/main" val="4174163929"/>
+      </p:ext>
+    </p:extLst>
+  </p:cSld>
+  <p:clrMapOvr>
+    <a:masterClrMapping/>
+  </p:clrMapOvr>
+</p:sld>
+</file>
+
+<file path=ppt/slides/slide20.xml><?xml version="1.0" encoding="utf-8"?>
 <p:sld xmlns:a="http://schemas.openxmlformats.org/drawingml/2006/main" xmlns:r="http://schemas.openxmlformats.org/officeDocument/2006/relationships" xmlns:p="http://schemas.openxmlformats.org/presentationml/2006/main">
   <p:cSld>
     <p:spTree>
@@ -17346,224 +18010,7 @@
 </p:sld>
 </file>
 
-<file path=ppt/slides/slide2.xml><?xml version="1.0" encoding="utf-8"?>
-<p:sld xmlns:a="http://schemas.openxmlformats.org/drawingml/2006/main" xmlns:r="http://schemas.openxmlformats.org/officeDocument/2006/relationships" xmlns:p="http://schemas.openxmlformats.org/presentationml/2006/main">
-  <p:cSld>
-    <p:spTree>
-      <p:nvGrpSpPr>
-        <p:cNvPr id="1" name=""/>
-        <p:cNvGrpSpPr/>
-        <p:nvPr/>
-      </p:nvGrpSpPr>
-      <p:grpSpPr>
-        <a:xfrm>
-          <a:off x="0" y="0"/>
-          <a:ext cx="0" cy="0"/>
-          <a:chOff x="0" y="0"/>
-          <a:chExt cx="0" cy="0"/>
-        </a:xfrm>
-      </p:grpSpPr>
-      <p:sp>
-        <p:nvSpPr>
-          <p:cNvPr id="4" name="사각형: 둥근 모서리 3">
-            <a:extLst>
-              <a:ext uri="{FF2B5EF4-FFF2-40B4-BE49-F238E27FC236}">
-                <a16:creationId xmlns:a16="http://schemas.microsoft.com/office/drawing/2014/main" id="{C76EA980-B62D-4566-B2A4-B52D32E68044}"/>
-              </a:ext>
-            </a:extLst>
-          </p:cNvPr>
-          <p:cNvSpPr/>
-          <p:nvPr/>
-        </p:nvSpPr>
-        <p:spPr>
-          <a:xfrm>
-            <a:off x="332509" y="129309"/>
-            <a:ext cx="3537527" cy="471608"/>
-          </a:xfrm>
-          <a:prstGeom prst="roundRect">
-            <a:avLst/>
-          </a:prstGeom>
-        </p:spPr>
-        <p:style>
-          <a:lnRef idx="2">
-            <a:schemeClr val="accent1">
-              <a:shade val="50000"/>
-            </a:schemeClr>
-          </a:lnRef>
-          <a:fillRef idx="1">
-            <a:schemeClr val="accent1"/>
-          </a:fillRef>
-          <a:effectRef idx="0">
-            <a:schemeClr val="accent1"/>
-          </a:effectRef>
-          <a:fontRef idx="minor">
-            <a:schemeClr val="lt1"/>
-          </a:fontRef>
-        </p:style>
-        <p:txBody>
-          <a:bodyPr rtlCol="0" anchor="ctr"/>
-          <a:lstStyle/>
-          <a:p>
-            <a:pPr algn="ctr"/>
-            <a:r>
-              <a:rPr lang="en-US" altLang="ko-KR" dirty="0"/>
-              <a:t>Stage 2</a:t>
-            </a:r>
-            <a:endParaRPr lang="ko-KR" altLang="en-US" dirty="0"/>
-          </a:p>
-        </p:txBody>
-      </p:sp>
-      <p:sp>
-        <p:nvSpPr>
-          <p:cNvPr id="7" name="사각형: 둥근 모서리 6">
-            <a:extLst>
-              <a:ext uri="{FF2B5EF4-FFF2-40B4-BE49-F238E27FC236}">
-                <a16:creationId xmlns:a16="http://schemas.microsoft.com/office/drawing/2014/main" id="{AE89B528-3261-4718-BB05-CDA2A5F55064}"/>
-              </a:ext>
-            </a:extLst>
-          </p:cNvPr>
-          <p:cNvSpPr/>
-          <p:nvPr/>
-        </p:nvSpPr>
-        <p:spPr>
-          <a:xfrm>
-            <a:off x="3694020" y="1970795"/>
-            <a:ext cx="3298971" cy="3298971"/>
-          </a:xfrm>
-          <a:prstGeom prst="roundRect">
-            <a:avLst>
-              <a:gd name="adj" fmla="val 0"/>
-            </a:avLst>
-          </a:prstGeom>
-          <a:noFill/>
-          <a:ln>
-            <a:solidFill>
-              <a:schemeClr val="tx1"/>
-            </a:solidFill>
-          </a:ln>
-        </p:spPr>
-        <p:style>
-          <a:lnRef idx="2">
-            <a:schemeClr val="accent1">
-              <a:shade val="50000"/>
-            </a:schemeClr>
-          </a:lnRef>
-          <a:fillRef idx="1">
-            <a:schemeClr val="accent1"/>
-          </a:fillRef>
-          <a:effectRef idx="0">
-            <a:schemeClr val="accent1"/>
-          </a:effectRef>
-          <a:fontRef idx="minor">
-            <a:schemeClr val="lt1"/>
-          </a:fontRef>
-        </p:style>
-        <p:txBody>
-          <a:bodyPr rtlCol="0" anchor="ctr"/>
-          <a:lstStyle/>
-          <a:p>
-            <a:pPr algn="ctr"/>
-            <a:endParaRPr lang="ko-KR" altLang="en-US" dirty="0"/>
-          </a:p>
-        </p:txBody>
-      </p:sp>
-      <p:sp>
-        <p:nvSpPr>
-          <p:cNvPr id="8" name="타원 7">
-            <a:extLst>
-              <a:ext uri="{FF2B5EF4-FFF2-40B4-BE49-F238E27FC236}">
-                <a16:creationId xmlns:a16="http://schemas.microsoft.com/office/drawing/2014/main" id="{30ECAA68-9AAB-48BF-8F07-165BE27125E8}"/>
-              </a:ext>
-            </a:extLst>
-          </p:cNvPr>
-          <p:cNvSpPr/>
-          <p:nvPr/>
-        </p:nvSpPr>
-        <p:spPr>
-          <a:xfrm>
-            <a:off x="3855161" y="4568585"/>
-            <a:ext cx="578840" cy="578840"/>
-          </a:xfrm>
-          <a:prstGeom prst="ellipse">
-            <a:avLst/>
-          </a:prstGeom>
-          <a:solidFill>
-            <a:schemeClr val="tx1"/>
-          </a:solidFill>
-          <a:ln>
-            <a:solidFill>
-              <a:schemeClr val="tx1"/>
-            </a:solidFill>
-          </a:ln>
-        </p:spPr>
-        <p:style>
-          <a:lnRef idx="2">
-            <a:schemeClr val="accent1">
-              <a:shade val="50000"/>
-            </a:schemeClr>
-          </a:lnRef>
-          <a:fillRef idx="1">
-            <a:schemeClr val="accent1"/>
-          </a:fillRef>
-          <a:effectRef idx="0">
-            <a:schemeClr val="accent1"/>
-          </a:effectRef>
-          <a:fontRef idx="minor">
-            <a:schemeClr val="lt1"/>
-          </a:fontRef>
-        </p:style>
-        <p:txBody>
-          <a:bodyPr rtlCol="0" anchor="ctr"/>
-          <a:lstStyle/>
-          <a:p>
-            <a:pPr algn="ctr"/>
-            <a:endParaRPr lang="ko-KR" altLang="en-US"/>
-          </a:p>
-        </p:txBody>
-      </p:sp>
-      <p:pic>
-        <p:nvPicPr>
-          <p:cNvPr id="9" name="그림 8">
-            <a:extLst>
-              <a:ext uri="{FF2B5EF4-FFF2-40B4-BE49-F238E27FC236}">
-                <a16:creationId xmlns:a16="http://schemas.microsoft.com/office/drawing/2014/main" id="{8DEF7333-DB52-4EA3-8B8C-9786C4B4E306}"/>
-              </a:ext>
-            </a:extLst>
-          </p:cNvPr>
-          <p:cNvPicPr>
-            <a:picLocks noChangeAspect="1"/>
-          </p:cNvPicPr>
-          <p:nvPr/>
-        </p:nvPicPr>
-        <p:blipFill rotWithShape="1">
-          <a:blip r:embed="rId2"/>
-          <a:srcRect l="48567"/>
-          <a:stretch/>
-        </p:blipFill>
-        <p:spPr>
-          <a:xfrm>
-            <a:off x="3694020" y="3065496"/>
-            <a:ext cx="200682" cy="1109568"/>
-          </a:xfrm>
-          <a:prstGeom prst="rect">
-            <a:avLst/>
-          </a:prstGeom>
-        </p:spPr>
-      </p:pic>
-    </p:spTree>
-    <p:extLst>
-      <p:ext uri="{BB962C8B-B14F-4D97-AF65-F5344CB8AC3E}">
-        <p14:creationId xmlns:p14="http://schemas.microsoft.com/office/powerpoint/2010/main" val="616079119"/>
-      </p:ext>
-    </p:extLst>
-  </p:cSld>
-  <p:clrMapOvr>
-    <a:masterClrMapping/>
-  </p:clrMapOvr>
-</p:sld>
-</file>
-
-<file path=ppt/slides/slide20.xml><?xml version="1.0" encoding="utf-8"?>
+<file path=ppt/slides/slide21.xml><?xml version="1.0" encoding="utf-8"?>
 <p:sld xmlns:a="http://schemas.openxmlformats.org/drawingml/2006/main" xmlns:r="http://schemas.openxmlformats.org/officeDocument/2006/relationships" xmlns:p="http://schemas.openxmlformats.org/presentationml/2006/main">
   <p:cSld>
     <p:spTree>
@@ -17793,7 +18240,7 @@
 </p:sld>
 </file>
 
-<file path=ppt/slides/slide21.xml><?xml version="1.0" encoding="utf-8"?>
+<file path=ppt/slides/slide22.xml><?xml version="1.0" encoding="utf-8"?>
 <p:sld xmlns:a="http://schemas.openxmlformats.org/drawingml/2006/main" xmlns:r="http://schemas.openxmlformats.org/officeDocument/2006/relationships" xmlns:p="http://schemas.openxmlformats.org/presentationml/2006/main">
   <p:cSld>
     <p:spTree>
@@ -18320,6 +18767,223 @@
             <a:pPr algn="ctr"/>
             <a:r>
               <a:rPr lang="en-US" altLang="ko-KR" dirty="0"/>
+              <a:t>Stage 2</a:t>
+            </a:r>
+            <a:endParaRPr lang="ko-KR" altLang="en-US" dirty="0"/>
+          </a:p>
+        </p:txBody>
+      </p:sp>
+      <p:sp>
+        <p:nvSpPr>
+          <p:cNvPr id="7" name="사각형: 둥근 모서리 6">
+            <a:extLst>
+              <a:ext uri="{FF2B5EF4-FFF2-40B4-BE49-F238E27FC236}">
+                <a16:creationId xmlns:a16="http://schemas.microsoft.com/office/drawing/2014/main" id="{AE89B528-3261-4718-BB05-CDA2A5F55064}"/>
+              </a:ext>
+            </a:extLst>
+          </p:cNvPr>
+          <p:cNvSpPr/>
+          <p:nvPr/>
+        </p:nvSpPr>
+        <p:spPr>
+          <a:xfrm>
+            <a:off x="3694020" y="1970795"/>
+            <a:ext cx="3298971" cy="3298971"/>
+          </a:xfrm>
+          <a:prstGeom prst="roundRect">
+            <a:avLst>
+              <a:gd name="adj" fmla="val 0"/>
+            </a:avLst>
+          </a:prstGeom>
+          <a:noFill/>
+          <a:ln>
+            <a:solidFill>
+              <a:schemeClr val="tx1"/>
+            </a:solidFill>
+          </a:ln>
+        </p:spPr>
+        <p:style>
+          <a:lnRef idx="2">
+            <a:schemeClr val="accent1">
+              <a:shade val="50000"/>
+            </a:schemeClr>
+          </a:lnRef>
+          <a:fillRef idx="1">
+            <a:schemeClr val="accent1"/>
+          </a:fillRef>
+          <a:effectRef idx="0">
+            <a:schemeClr val="accent1"/>
+          </a:effectRef>
+          <a:fontRef idx="minor">
+            <a:schemeClr val="lt1"/>
+          </a:fontRef>
+        </p:style>
+        <p:txBody>
+          <a:bodyPr rtlCol="0" anchor="ctr"/>
+          <a:lstStyle/>
+          <a:p>
+            <a:pPr algn="ctr"/>
+            <a:endParaRPr lang="ko-KR" altLang="en-US" dirty="0"/>
+          </a:p>
+        </p:txBody>
+      </p:sp>
+      <p:sp>
+        <p:nvSpPr>
+          <p:cNvPr id="8" name="타원 7">
+            <a:extLst>
+              <a:ext uri="{FF2B5EF4-FFF2-40B4-BE49-F238E27FC236}">
+                <a16:creationId xmlns:a16="http://schemas.microsoft.com/office/drawing/2014/main" id="{30ECAA68-9AAB-48BF-8F07-165BE27125E8}"/>
+              </a:ext>
+            </a:extLst>
+          </p:cNvPr>
+          <p:cNvSpPr/>
+          <p:nvPr/>
+        </p:nvSpPr>
+        <p:spPr>
+          <a:xfrm>
+            <a:off x="3855161" y="4568585"/>
+            <a:ext cx="578840" cy="578840"/>
+          </a:xfrm>
+          <a:prstGeom prst="ellipse">
+            <a:avLst/>
+          </a:prstGeom>
+          <a:solidFill>
+            <a:schemeClr val="tx1"/>
+          </a:solidFill>
+          <a:ln>
+            <a:solidFill>
+              <a:schemeClr val="tx1"/>
+            </a:solidFill>
+          </a:ln>
+        </p:spPr>
+        <p:style>
+          <a:lnRef idx="2">
+            <a:schemeClr val="accent1">
+              <a:shade val="50000"/>
+            </a:schemeClr>
+          </a:lnRef>
+          <a:fillRef idx="1">
+            <a:schemeClr val="accent1"/>
+          </a:fillRef>
+          <a:effectRef idx="0">
+            <a:schemeClr val="accent1"/>
+          </a:effectRef>
+          <a:fontRef idx="minor">
+            <a:schemeClr val="lt1"/>
+          </a:fontRef>
+        </p:style>
+        <p:txBody>
+          <a:bodyPr rtlCol="0" anchor="ctr"/>
+          <a:lstStyle/>
+          <a:p>
+            <a:pPr algn="ctr"/>
+            <a:endParaRPr lang="ko-KR" altLang="en-US"/>
+          </a:p>
+        </p:txBody>
+      </p:sp>
+      <p:pic>
+        <p:nvPicPr>
+          <p:cNvPr id="9" name="그림 8">
+            <a:extLst>
+              <a:ext uri="{FF2B5EF4-FFF2-40B4-BE49-F238E27FC236}">
+                <a16:creationId xmlns:a16="http://schemas.microsoft.com/office/drawing/2014/main" id="{8DEF7333-DB52-4EA3-8B8C-9786C4B4E306}"/>
+              </a:ext>
+            </a:extLst>
+          </p:cNvPr>
+          <p:cNvPicPr>
+            <a:picLocks noChangeAspect="1"/>
+          </p:cNvPicPr>
+          <p:nvPr/>
+        </p:nvPicPr>
+        <p:blipFill rotWithShape="1">
+          <a:blip r:embed="rId2"/>
+          <a:srcRect l="48567"/>
+          <a:stretch/>
+        </p:blipFill>
+        <p:spPr>
+          <a:xfrm>
+            <a:off x="3694020" y="3065496"/>
+            <a:ext cx="200682" cy="1109568"/>
+          </a:xfrm>
+          <a:prstGeom prst="rect">
+            <a:avLst/>
+          </a:prstGeom>
+        </p:spPr>
+      </p:pic>
+    </p:spTree>
+    <p:extLst>
+      <p:ext uri="{BB962C8B-B14F-4D97-AF65-F5344CB8AC3E}">
+        <p14:creationId xmlns:p14="http://schemas.microsoft.com/office/powerpoint/2010/main" val="616079119"/>
+      </p:ext>
+    </p:extLst>
+  </p:cSld>
+  <p:clrMapOvr>
+    <a:masterClrMapping/>
+  </p:clrMapOvr>
+</p:sld>
+</file>
+
+<file path=ppt/slides/slide4.xml><?xml version="1.0" encoding="utf-8"?>
+<p:sld xmlns:a="http://schemas.openxmlformats.org/drawingml/2006/main" xmlns:r="http://schemas.openxmlformats.org/officeDocument/2006/relationships" xmlns:p="http://schemas.openxmlformats.org/presentationml/2006/main">
+  <p:cSld>
+    <p:spTree>
+      <p:nvGrpSpPr>
+        <p:cNvPr id="1" name=""/>
+        <p:cNvGrpSpPr/>
+        <p:nvPr/>
+      </p:nvGrpSpPr>
+      <p:grpSpPr>
+        <a:xfrm>
+          <a:off x="0" y="0"/>
+          <a:ext cx="0" cy="0"/>
+          <a:chOff x="0" y="0"/>
+          <a:chExt cx="0" cy="0"/>
+        </a:xfrm>
+      </p:grpSpPr>
+      <p:sp>
+        <p:nvSpPr>
+          <p:cNvPr id="4" name="사각형: 둥근 모서리 3">
+            <a:extLst>
+              <a:ext uri="{FF2B5EF4-FFF2-40B4-BE49-F238E27FC236}">
+                <a16:creationId xmlns:a16="http://schemas.microsoft.com/office/drawing/2014/main" id="{C76EA980-B62D-4566-B2A4-B52D32E68044}"/>
+              </a:ext>
+            </a:extLst>
+          </p:cNvPr>
+          <p:cNvSpPr/>
+          <p:nvPr/>
+        </p:nvSpPr>
+        <p:spPr>
+          <a:xfrm>
+            <a:off x="332509" y="129309"/>
+            <a:ext cx="3537527" cy="471608"/>
+          </a:xfrm>
+          <a:prstGeom prst="roundRect">
+            <a:avLst/>
+          </a:prstGeom>
+        </p:spPr>
+        <p:style>
+          <a:lnRef idx="2">
+            <a:schemeClr val="accent1">
+              <a:shade val="50000"/>
+            </a:schemeClr>
+          </a:lnRef>
+          <a:fillRef idx="1">
+            <a:schemeClr val="accent1"/>
+          </a:fillRef>
+          <a:effectRef idx="0">
+            <a:schemeClr val="accent1"/>
+          </a:effectRef>
+          <a:fontRef idx="minor">
+            <a:schemeClr val="lt1"/>
+          </a:fontRef>
+        </p:style>
+        <p:txBody>
+          <a:bodyPr rtlCol="0" anchor="ctr"/>
+          <a:lstStyle/>
+          <a:p>
+            <a:pPr algn="ctr"/>
+            <a:r>
+              <a:rPr lang="en-US" altLang="ko-KR" dirty="0"/>
               <a:t>Stage 3</a:t>
             </a:r>
             <a:endParaRPr lang="ko-KR" altLang="en-US" dirty="0"/>
@@ -18369,7 +19033,7 @@
 </p:sld>
 </file>
 
-<file path=ppt/slides/slide4.xml><?xml version="1.0" encoding="utf-8"?>
+<file path=ppt/slides/slide5.xml><?xml version="1.0" encoding="utf-8"?>
 <p:sld xmlns:a="http://schemas.openxmlformats.org/drawingml/2006/main" xmlns:r="http://schemas.openxmlformats.org/officeDocument/2006/relationships" xmlns:p="http://schemas.openxmlformats.org/presentationml/2006/main">
   <p:cSld>
     <p:spTree>
@@ -18479,7 +19143,7 @@
 </p:sld>
 </file>
 
-<file path=ppt/slides/slide5.xml><?xml version="1.0" encoding="utf-8"?>
+<file path=ppt/slides/slide6.xml><?xml version="1.0" encoding="utf-8"?>
 <p:sld xmlns:a="http://schemas.openxmlformats.org/drawingml/2006/main" xmlns:r="http://schemas.openxmlformats.org/officeDocument/2006/relationships" xmlns:p="http://schemas.openxmlformats.org/presentationml/2006/main">
   <p:cSld>
     <p:spTree>
@@ -18559,7 +19223,7 @@
 </p:sld>
 </file>
 
-<file path=ppt/slides/slide6.xml><?xml version="1.0" encoding="utf-8"?>
+<file path=ppt/slides/slide7.xml><?xml version="1.0" encoding="utf-8"?>
 <p:sld xmlns:a="http://schemas.openxmlformats.org/drawingml/2006/main" xmlns:r="http://schemas.openxmlformats.org/officeDocument/2006/relationships" xmlns:p="http://schemas.openxmlformats.org/presentationml/2006/main">
   <p:cSld>
     <p:spTree>
@@ -19272,7 +19936,7 @@
 </p:sld>
 </file>
 
-<file path=ppt/slides/slide7.xml><?xml version="1.0" encoding="utf-8"?>
+<file path=ppt/slides/slide8.xml><?xml version="1.0" encoding="utf-8"?>
 <p:sld xmlns:a="http://schemas.openxmlformats.org/drawingml/2006/main" xmlns:r="http://schemas.openxmlformats.org/officeDocument/2006/relationships" xmlns:p="http://schemas.openxmlformats.org/presentationml/2006/main">
   <p:cSld>
     <p:spTree>
@@ -19446,7 +20110,7 @@
 </p:sld>
 </file>
 
-<file path=ppt/slides/slide8.xml><?xml version="1.0" encoding="utf-8"?>
+<file path=ppt/slides/slide9.xml><?xml version="1.0" encoding="utf-8"?>
 <p:sld xmlns:a="http://schemas.openxmlformats.org/drawingml/2006/main" xmlns:r="http://schemas.openxmlformats.org/officeDocument/2006/relationships" xmlns:p="http://schemas.openxmlformats.org/presentationml/2006/main">
   <p:cSld>
     <p:spTree>
@@ -19679,445 +20343,6 @@
     <p:extLst>
       <p:ext uri="{BB962C8B-B14F-4D97-AF65-F5344CB8AC3E}">
         <p14:creationId xmlns:p14="http://schemas.microsoft.com/office/powerpoint/2010/main" val="3183050681"/>
-      </p:ext>
-    </p:extLst>
-  </p:cSld>
-  <p:clrMapOvr>
-    <a:masterClrMapping/>
-  </p:clrMapOvr>
-</p:sld>
-</file>
-
-<file path=ppt/slides/slide9.xml><?xml version="1.0" encoding="utf-8"?>
-<p:sld xmlns:a="http://schemas.openxmlformats.org/drawingml/2006/main" xmlns:r="http://schemas.openxmlformats.org/officeDocument/2006/relationships" xmlns:p="http://schemas.openxmlformats.org/presentationml/2006/main">
-  <p:cSld>
-    <p:spTree>
-      <p:nvGrpSpPr>
-        <p:cNvPr id="1" name=""/>
-        <p:cNvGrpSpPr/>
-        <p:nvPr/>
-      </p:nvGrpSpPr>
-      <p:grpSpPr>
-        <a:xfrm>
-          <a:off x="0" y="0"/>
-          <a:ext cx="0" cy="0"/>
-          <a:chOff x="0" y="0"/>
-          <a:chExt cx="0" cy="0"/>
-        </a:xfrm>
-      </p:grpSpPr>
-      <p:grpSp>
-        <p:nvGrpSpPr>
-          <p:cNvPr id="27" name="그룹 26">
-            <a:extLst>
-              <a:ext uri="{FF2B5EF4-FFF2-40B4-BE49-F238E27FC236}">
-                <a16:creationId xmlns:a16="http://schemas.microsoft.com/office/drawing/2014/main" id="{F0EBB88B-A95A-463A-9125-269913217D3E}"/>
-              </a:ext>
-            </a:extLst>
-          </p:cNvPr>
-          <p:cNvGrpSpPr/>
-          <p:nvPr/>
-        </p:nvGrpSpPr>
-        <p:grpSpPr>
-          <a:xfrm>
-            <a:off x="2294983" y="327231"/>
-            <a:ext cx="6723078" cy="3298971"/>
-            <a:chOff x="2465313" y="67113"/>
-            <a:chExt cx="6723078" cy="3298971"/>
-          </a:xfrm>
-        </p:grpSpPr>
-        <p:grpSp>
-          <p:nvGrpSpPr>
-            <p:cNvPr id="28" name="그룹 27">
-              <a:extLst>
-                <a:ext uri="{FF2B5EF4-FFF2-40B4-BE49-F238E27FC236}">
-                  <a16:creationId xmlns:a16="http://schemas.microsoft.com/office/drawing/2014/main" id="{197D83E5-C78D-4159-8E08-C579ED75DD21}"/>
-                </a:ext>
-              </a:extLst>
-            </p:cNvPr>
-            <p:cNvGrpSpPr/>
-            <p:nvPr/>
-          </p:nvGrpSpPr>
-          <p:grpSpPr>
-            <a:xfrm>
-              <a:off x="2465313" y="67113"/>
-              <a:ext cx="6723078" cy="3298971"/>
-              <a:chOff x="2456924" y="1"/>
-              <a:chExt cx="6723078" cy="3298971"/>
-            </a:xfrm>
-          </p:grpSpPr>
-          <p:sp>
-            <p:nvSpPr>
-              <p:cNvPr id="31" name="사각형: 둥근 모서리 30">
-                <a:extLst>
-                  <a:ext uri="{FF2B5EF4-FFF2-40B4-BE49-F238E27FC236}">
-                    <a16:creationId xmlns:a16="http://schemas.microsoft.com/office/drawing/2014/main" id="{A452F71E-D4A8-4511-B35F-3B6267A09604}"/>
-                  </a:ext>
-                </a:extLst>
-              </p:cNvPr>
-              <p:cNvSpPr/>
-              <p:nvPr/>
-            </p:nvSpPr>
-            <p:spPr>
-              <a:xfrm>
-                <a:off x="5881031" y="1"/>
-                <a:ext cx="3298971" cy="3298971"/>
-              </a:xfrm>
-              <a:prstGeom prst="roundRect">
-                <a:avLst>
-                  <a:gd name="adj" fmla="val 0"/>
-                </a:avLst>
-              </a:prstGeom>
-              <a:noFill/>
-              <a:ln>
-                <a:solidFill>
-                  <a:schemeClr val="tx1"/>
-                </a:solidFill>
-              </a:ln>
-            </p:spPr>
-            <p:style>
-              <a:lnRef idx="2">
-                <a:schemeClr val="accent1">
-                  <a:shade val="50000"/>
-                </a:schemeClr>
-              </a:lnRef>
-              <a:fillRef idx="1">
-                <a:schemeClr val="accent1"/>
-              </a:fillRef>
-              <a:effectRef idx="0">
-                <a:schemeClr val="accent1"/>
-              </a:effectRef>
-              <a:fontRef idx="minor">
-                <a:schemeClr val="lt1"/>
-              </a:fontRef>
-            </p:style>
-            <p:txBody>
-              <a:bodyPr rtlCol="0" anchor="ctr"/>
-              <a:lstStyle/>
-              <a:p>
-                <a:pPr algn="ctr"/>
-                <a:endParaRPr lang="ko-KR" altLang="en-US" dirty="0"/>
-              </a:p>
-            </p:txBody>
-          </p:sp>
-          <p:sp>
-            <p:nvSpPr>
-              <p:cNvPr id="32" name="사각형: 둥근 모서리 31">
-                <a:extLst>
-                  <a:ext uri="{FF2B5EF4-FFF2-40B4-BE49-F238E27FC236}">
-                    <a16:creationId xmlns:a16="http://schemas.microsoft.com/office/drawing/2014/main" id="{28AA6987-18D0-4301-A7F7-D3EA48FEA08E}"/>
-                  </a:ext>
-                </a:extLst>
-              </p:cNvPr>
-              <p:cNvSpPr/>
-              <p:nvPr/>
-            </p:nvSpPr>
-            <p:spPr>
-              <a:xfrm>
-                <a:off x="2456924" y="1"/>
-                <a:ext cx="3298971" cy="3298971"/>
-              </a:xfrm>
-              <a:prstGeom prst="roundRect">
-                <a:avLst>
-                  <a:gd name="adj" fmla="val 0"/>
-                </a:avLst>
-              </a:prstGeom>
-              <a:noFill/>
-              <a:ln>
-                <a:solidFill>
-                  <a:schemeClr val="tx1"/>
-                </a:solidFill>
-              </a:ln>
-            </p:spPr>
-            <p:style>
-              <a:lnRef idx="2">
-                <a:schemeClr val="accent1">
-                  <a:shade val="50000"/>
-                </a:schemeClr>
-              </a:lnRef>
-              <a:fillRef idx="1">
-                <a:schemeClr val="accent1"/>
-              </a:fillRef>
-              <a:effectRef idx="0">
-                <a:schemeClr val="accent1"/>
-              </a:effectRef>
-              <a:fontRef idx="minor">
-                <a:schemeClr val="lt1"/>
-              </a:fontRef>
-            </p:style>
-            <p:txBody>
-              <a:bodyPr rtlCol="0" anchor="ctr"/>
-              <a:lstStyle/>
-              <a:p>
-                <a:pPr algn="ctr"/>
-                <a:endParaRPr lang="ko-KR" altLang="en-US" dirty="0"/>
-              </a:p>
-            </p:txBody>
-          </p:sp>
-          <p:sp>
-            <p:nvSpPr>
-              <p:cNvPr id="33" name="타원 32">
-                <a:extLst>
-                  <a:ext uri="{FF2B5EF4-FFF2-40B4-BE49-F238E27FC236}">
-                    <a16:creationId xmlns:a16="http://schemas.microsoft.com/office/drawing/2014/main" id="{1AEE5C8A-BDCE-4B8B-B0BA-F8D5ECF20E30}"/>
-                  </a:ext>
-                </a:extLst>
-              </p:cNvPr>
-              <p:cNvSpPr/>
-              <p:nvPr/>
-            </p:nvSpPr>
-            <p:spPr>
-              <a:xfrm>
-                <a:off x="2618065" y="2597791"/>
-                <a:ext cx="578840" cy="578840"/>
-              </a:xfrm>
-              <a:prstGeom prst="ellipse">
-                <a:avLst/>
-              </a:prstGeom>
-              <a:solidFill>
-                <a:schemeClr val="tx1"/>
-              </a:solidFill>
-              <a:ln>
-                <a:solidFill>
-                  <a:schemeClr val="tx1"/>
-                </a:solidFill>
-              </a:ln>
-            </p:spPr>
-            <p:style>
-              <a:lnRef idx="2">
-                <a:schemeClr val="accent1">
-                  <a:shade val="50000"/>
-                </a:schemeClr>
-              </a:lnRef>
-              <a:fillRef idx="1">
-                <a:schemeClr val="accent1"/>
-              </a:fillRef>
-              <a:effectRef idx="0">
-                <a:schemeClr val="accent1"/>
-              </a:effectRef>
-              <a:fontRef idx="minor">
-                <a:schemeClr val="lt1"/>
-              </a:fontRef>
-            </p:style>
-            <p:txBody>
-              <a:bodyPr rtlCol="0" anchor="ctr"/>
-              <a:lstStyle/>
-              <a:p>
-                <a:pPr algn="ctr"/>
-                <a:endParaRPr lang="ko-KR" altLang="en-US"/>
-              </a:p>
-            </p:txBody>
-          </p:sp>
-          <p:sp>
-            <p:nvSpPr>
-              <p:cNvPr id="34" name="타원 33">
-                <a:extLst>
-                  <a:ext uri="{FF2B5EF4-FFF2-40B4-BE49-F238E27FC236}">
-                    <a16:creationId xmlns:a16="http://schemas.microsoft.com/office/drawing/2014/main" id="{DAC31FC5-16FC-4FB3-832D-3F9860AF8C4B}"/>
-                  </a:ext>
-                </a:extLst>
-              </p:cNvPr>
-              <p:cNvSpPr/>
-              <p:nvPr/>
-            </p:nvSpPr>
-            <p:spPr>
-              <a:xfrm>
-                <a:off x="6096000" y="2597791"/>
-                <a:ext cx="578840" cy="578840"/>
-              </a:xfrm>
-              <a:prstGeom prst="ellipse">
-                <a:avLst/>
-              </a:prstGeom>
-              <a:solidFill>
-                <a:schemeClr val="tx1"/>
-              </a:solidFill>
-              <a:ln>
-                <a:solidFill>
-                  <a:schemeClr val="tx1"/>
-                </a:solidFill>
-              </a:ln>
-            </p:spPr>
-            <p:style>
-              <a:lnRef idx="2">
-                <a:schemeClr val="accent1">
-                  <a:shade val="50000"/>
-                </a:schemeClr>
-              </a:lnRef>
-              <a:fillRef idx="1">
-                <a:schemeClr val="accent1"/>
-              </a:fillRef>
-              <a:effectRef idx="0">
-                <a:schemeClr val="accent1"/>
-              </a:effectRef>
-              <a:fontRef idx="minor">
-                <a:schemeClr val="lt1"/>
-              </a:fontRef>
-            </p:style>
-            <p:txBody>
-              <a:bodyPr rtlCol="0" anchor="ctr"/>
-              <a:lstStyle/>
-              <a:p>
-                <a:pPr algn="ctr"/>
-                <a:endParaRPr lang="ko-KR" altLang="en-US"/>
-              </a:p>
-            </p:txBody>
-          </p:sp>
-        </p:grpSp>
-        <p:pic>
-          <p:nvPicPr>
-            <p:cNvPr id="29" name="그림 28">
-              <a:extLst>
-                <a:ext uri="{FF2B5EF4-FFF2-40B4-BE49-F238E27FC236}">
-                  <a16:creationId xmlns:a16="http://schemas.microsoft.com/office/drawing/2014/main" id="{768F443E-97DE-44D4-AFC3-0D9913956B70}"/>
-                </a:ext>
-              </a:extLst>
-            </p:cNvPr>
-            <p:cNvPicPr>
-              <a:picLocks noChangeAspect="1"/>
-            </p:cNvPicPr>
-            <p:nvPr/>
-          </p:nvPicPr>
-          <p:blipFill rotWithShape="1">
-            <a:blip r:embed="rId2"/>
-            <a:srcRect l="48567"/>
-            <a:stretch/>
-          </p:blipFill>
-          <p:spPr>
-            <a:xfrm>
-              <a:off x="2465313" y="1161814"/>
-              <a:ext cx="200682" cy="1109568"/>
-            </a:xfrm>
-            <a:prstGeom prst="rect">
-              <a:avLst/>
-            </a:prstGeom>
-          </p:spPr>
-        </p:pic>
-        <p:pic>
-          <p:nvPicPr>
-            <p:cNvPr id="30" name="그림 29">
-              <a:extLst>
-                <a:ext uri="{FF2B5EF4-FFF2-40B4-BE49-F238E27FC236}">
-                  <a16:creationId xmlns:a16="http://schemas.microsoft.com/office/drawing/2014/main" id="{DF0DC684-7412-41B8-9899-20AB36A11B9D}"/>
-                </a:ext>
-              </a:extLst>
-            </p:cNvPr>
-            <p:cNvPicPr>
-              <a:picLocks noChangeAspect="1"/>
-            </p:cNvPicPr>
-            <p:nvPr/>
-          </p:nvPicPr>
-          <p:blipFill rotWithShape="1">
-            <a:blip r:embed="rId2"/>
-            <a:srcRect l="48567"/>
-            <a:stretch/>
-          </p:blipFill>
-          <p:spPr>
-            <a:xfrm rot="10800000">
-              <a:off x="8987709" y="1161814"/>
-              <a:ext cx="200682" cy="1109568"/>
-            </a:xfrm>
-            <a:prstGeom prst="rect">
-              <a:avLst/>
-            </a:prstGeom>
-          </p:spPr>
-        </p:pic>
-      </p:grpSp>
-      <p:grpSp>
-        <p:nvGrpSpPr>
-          <p:cNvPr id="35" name="그룹 34">
-            <a:extLst>
-              <a:ext uri="{FF2B5EF4-FFF2-40B4-BE49-F238E27FC236}">
-                <a16:creationId xmlns:a16="http://schemas.microsoft.com/office/drawing/2014/main" id="{948FB134-BC2C-4E67-B1F0-ADF0F290D578}"/>
-              </a:ext>
-            </a:extLst>
-          </p:cNvPr>
-          <p:cNvGrpSpPr/>
-          <p:nvPr/>
-        </p:nvGrpSpPr>
-        <p:grpSpPr>
-          <a:xfrm>
-            <a:off x="3181255" y="4468243"/>
-            <a:ext cx="4825397" cy="1346032"/>
-            <a:chOff x="3683301" y="2755984"/>
-            <a:chExt cx="4825397" cy="1346032"/>
-          </a:xfrm>
-        </p:grpSpPr>
-        <p:pic>
-          <p:nvPicPr>
-            <p:cNvPr id="36" name="그림 35">
-              <a:extLst>
-                <a:ext uri="{FF2B5EF4-FFF2-40B4-BE49-F238E27FC236}">
-                  <a16:creationId xmlns:a16="http://schemas.microsoft.com/office/drawing/2014/main" id="{39FBB44F-2F07-423A-B117-AE46FEB592C9}"/>
-                </a:ext>
-              </a:extLst>
-            </p:cNvPr>
-            <p:cNvPicPr>
-              <a:picLocks noChangeAspect="1"/>
-            </p:cNvPicPr>
-            <p:nvPr/>
-          </p:nvPicPr>
-          <p:blipFill>
-            <a:blip r:embed="rId3">
-              <a:extLst>
-                <a:ext uri="{28A0092B-C50C-407E-A947-70E740481C1C}">
-                  <a14:useLocalDpi xmlns:a14="http://schemas.microsoft.com/office/drawing/2010/main" val="0"/>
-                </a:ext>
-              </a:extLst>
-            </a:blip>
-            <a:stretch>
-              <a:fillRect/>
-            </a:stretch>
-          </p:blipFill>
-          <p:spPr>
-            <a:xfrm>
-              <a:off x="3683301" y="2755984"/>
-              <a:ext cx="4825397" cy="1346032"/>
-            </a:xfrm>
-            <a:prstGeom prst="rect">
-              <a:avLst/>
-            </a:prstGeom>
-          </p:spPr>
-        </p:pic>
-        <p:pic>
-          <p:nvPicPr>
-            <p:cNvPr id="37" name="그림 36">
-              <a:extLst>
-                <a:ext uri="{FF2B5EF4-FFF2-40B4-BE49-F238E27FC236}">
-                  <a16:creationId xmlns:a16="http://schemas.microsoft.com/office/drawing/2014/main" id="{2920E4A2-967B-4831-B3A4-47119C4F11DF}"/>
-                </a:ext>
-              </a:extLst>
-            </p:cNvPr>
-            <p:cNvPicPr>
-              <a:picLocks noChangeAspect="1"/>
-            </p:cNvPicPr>
-            <p:nvPr/>
-          </p:nvPicPr>
-          <p:blipFill>
-            <a:blip r:embed="rId4">
-              <a:extLst>
-                <a:ext uri="{28A0092B-C50C-407E-A947-70E740481C1C}">
-                  <a14:useLocalDpi xmlns:a14="http://schemas.microsoft.com/office/drawing/2010/main" val="0"/>
-                </a:ext>
-              </a:extLst>
-            </a:blip>
-            <a:stretch>
-              <a:fillRect/>
-            </a:stretch>
-          </p:blipFill>
-          <p:spPr>
-            <a:xfrm>
-              <a:off x="3683301" y="2755984"/>
-              <a:ext cx="4825397" cy="1346032"/>
-            </a:xfrm>
-            <a:prstGeom prst="rect">
-              <a:avLst/>
-            </a:prstGeom>
-          </p:spPr>
-        </p:pic>
-      </p:grpSp>
-    </p:spTree>
-    <p:extLst>
-      <p:ext uri="{BB962C8B-B14F-4D97-AF65-F5344CB8AC3E}">
-        <p14:creationId xmlns:p14="http://schemas.microsoft.com/office/powerpoint/2010/main" val="1734364095"/>
       </p:ext>
     </p:extLst>
   </p:cSld>

</xml_diff>

<commit_message>
Stage.xlsx 업뎃, PartyBall.docx 업뎃
</commit_message>
<xml_diff>
--- a/Documents/PartyBall/Project_TheBalls.pptx
+++ b/Documents/PartyBall/Project_TheBalls.pptx
@@ -136,7 +136,7 @@
 <file path=ppt/revisionInfo.xml><?xml version="1.0" encoding="utf-8"?>
 <p1510:revInfo xmlns:a="http://schemas.openxmlformats.org/drawingml/2006/main" xmlns:r="http://schemas.openxmlformats.org/officeDocument/2006/relationships" xmlns:p1510="http://schemas.microsoft.com/office/powerpoint/2015/10/main">
   <p1510:revLst>
-    <p1510:client id="{A99FF4A5-BC7F-4010-AC4C-1C661166150A}" v="3" dt="2021-11-27T13:54:41.652"/>
+    <p1510:client id="{86DF080D-4DAD-4A4D-A91B-C5BDE91EEC96}" v="57" dt="2021-12-07T08:14:33.662"/>
   </p1510:revLst>
 </p1510:revInfo>
 </file>
@@ -852,6 +852,78 @@
             <ac:spMk id="6" creationId="{E04B0C46-5E0A-4B32-B582-F8D112DC1152}"/>
           </ac:spMkLst>
         </pc:spChg>
+      </pc:sldChg>
+    </pc:docChg>
+  </pc:docChgLst>
+  <pc:docChgLst>
+    <pc:chgData name="남 상현" userId="03ad4a8e8f7310f3" providerId="LiveId" clId="{86DF080D-4DAD-4A4D-A91B-C5BDE91EEC96}"/>
+    <pc:docChg chg="modSld">
+      <pc:chgData name="남 상현" userId="03ad4a8e8f7310f3" providerId="LiveId" clId="{86DF080D-4DAD-4A4D-A91B-C5BDE91EEC96}" dt="2021-12-07T08:14:33.662" v="59" actId="164"/>
+      <pc:docMkLst>
+        <pc:docMk/>
+      </pc:docMkLst>
+      <pc:sldChg chg="addSp delSp modSp mod">
+        <pc:chgData name="남 상현" userId="03ad4a8e8f7310f3" providerId="LiveId" clId="{86DF080D-4DAD-4A4D-A91B-C5BDE91EEC96}" dt="2021-12-07T08:14:33.662" v="59" actId="164"/>
+        <pc:sldMkLst>
+          <pc:docMk/>
+          <pc:sldMk cId="3554067655" sldId="266"/>
+        </pc:sldMkLst>
+        <pc:spChg chg="add mod">
+          <ac:chgData name="남 상현" userId="03ad4a8e8f7310f3" providerId="LiveId" clId="{86DF080D-4DAD-4A4D-A91B-C5BDE91EEC96}" dt="2021-12-07T08:14:29.993" v="58" actId="1076"/>
+          <ac:spMkLst>
+            <pc:docMk/>
+            <pc:sldMk cId="3554067655" sldId="266"/>
+            <ac:spMk id="8" creationId="{8E6EB622-5F7E-4847-BE05-93C75252A43A}"/>
+          </ac:spMkLst>
+        </pc:spChg>
+        <pc:grpChg chg="del mod">
+          <ac:chgData name="남 상현" userId="03ad4a8e8f7310f3" providerId="LiveId" clId="{86DF080D-4DAD-4A4D-A91B-C5BDE91EEC96}" dt="2021-12-07T08:06:20.153" v="40" actId="165"/>
+          <ac:grpSpMkLst>
+            <pc:docMk/>
+            <pc:sldMk cId="3554067655" sldId="266"/>
+            <ac:grpSpMk id="3" creationId="{6B14CDFC-00C8-4907-9BE1-906AB8433102}"/>
+          </ac:grpSpMkLst>
+        </pc:grpChg>
+        <pc:grpChg chg="add mod">
+          <ac:chgData name="남 상현" userId="03ad4a8e8f7310f3" providerId="LiveId" clId="{86DF080D-4DAD-4A4D-A91B-C5BDE91EEC96}" dt="2021-12-07T08:14:33.662" v="59" actId="164"/>
+          <ac:grpSpMkLst>
+            <pc:docMk/>
+            <pc:sldMk cId="3554067655" sldId="266"/>
+            <ac:grpSpMk id="9" creationId="{AD30CA76-1101-4794-8E9F-5739A5140320}"/>
+          </ac:grpSpMkLst>
+        </pc:grpChg>
+        <pc:graphicFrameChg chg="mod ord topLvl">
+          <ac:chgData name="남 상현" userId="03ad4a8e8f7310f3" providerId="LiveId" clId="{86DF080D-4DAD-4A4D-A91B-C5BDE91EEC96}" dt="2021-12-07T08:14:33.662" v="59" actId="164"/>
+          <ac:graphicFrameMkLst>
+            <pc:docMk/>
+            <pc:sldMk cId="3554067655" sldId="266"/>
+            <ac:graphicFrameMk id="2" creationId="{3ED1C52E-DEEA-4E29-A43F-0FA1C28D0669}"/>
+          </ac:graphicFrameMkLst>
+        </pc:graphicFrameChg>
+        <pc:graphicFrameChg chg="add mod">
+          <ac:chgData name="남 상현" userId="03ad4a8e8f7310f3" providerId="LiveId" clId="{86DF080D-4DAD-4A4D-A91B-C5BDE91EEC96}" dt="2021-12-07T08:01:59.259" v="1"/>
+          <ac:graphicFrameMkLst>
+            <pc:docMk/>
+            <pc:sldMk cId="3554067655" sldId="266"/>
+            <ac:graphicFrameMk id="5" creationId="{511BCE83-78CA-42D9-9010-4150D7786072}"/>
+          </ac:graphicFrameMkLst>
+        </pc:graphicFrameChg>
+        <pc:graphicFrameChg chg="add mod">
+          <ac:chgData name="남 상현" userId="03ad4a8e8f7310f3" providerId="LiveId" clId="{86DF080D-4DAD-4A4D-A91B-C5BDE91EEC96}" dt="2021-12-07T08:02:01.674" v="3"/>
+          <ac:graphicFrameMkLst>
+            <pc:docMk/>
+            <pc:sldMk cId="3554067655" sldId="266"/>
+            <ac:graphicFrameMk id="6" creationId="{8AEFE61F-9621-48BB-A1CA-87BAFCAAFEAE}"/>
+          </ac:graphicFrameMkLst>
+        </pc:graphicFrameChg>
+        <pc:picChg chg="mod topLvl">
+          <ac:chgData name="남 상현" userId="03ad4a8e8f7310f3" providerId="LiveId" clId="{86DF080D-4DAD-4A4D-A91B-C5BDE91EEC96}" dt="2021-12-07T08:14:33.662" v="59" actId="164"/>
+          <ac:picMkLst>
+            <pc:docMk/>
+            <pc:sldMk cId="3554067655" sldId="266"/>
+            <ac:picMk id="4" creationId="{D6B674CE-3539-4EF6-A92F-E0A422FA9B4F}"/>
+          </ac:picMkLst>
+        </pc:picChg>
       </pc:sldChg>
     </pc:docChg>
   </pc:docChgLst>
@@ -4624,7 +4696,7 @@
           <a:pPr latinLnBrk="1"/>
           <a:r>
             <a:rPr lang="ko-KR" altLang="en-US" b="1" dirty="0"/>
-            <a:t>설정</a:t>
+            <a:t>배치</a:t>
           </a:r>
         </a:p>
       </dgm:t>
@@ -4721,6 +4793,69 @@
         </a:p>
       </dgm:t>
     </dgm:pt>
+    <dgm:pt modelId="{0FC3AA81-AF68-45B5-8FE9-9D1CF0CA88BC}">
+      <dgm:prSet phldrT="[텍스트]"/>
+      <dgm:spPr>
+        <a:solidFill>
+          <a:srgbClr val="99CCFF"/>
+        </a:solidFill>
+        <a:ln>
+          <a:solidFill>
+            <a:srgbClr val="0070C0"/>
+          </a:solidFill>
+        </a:ln>
+      </dgm:spPr>
+      <dgm:t>
+        <a:bodyPr/>
+        <a:lstStyle/>
+        <a:p>
+          <a:pPr latinLnBrk="1"/>
+          <a:r>
+            <a:rPr lang="ko-KR" altLang="en-US" b="1" dirty="0"/>
+            <a:t>목적지</a:t>
+          </a:r>
+          <a:endParaRPr lang="en-US" altLang="ko-KR" b="1" dirty="0"/>
+        </a:p>
+        <a:p>
+          <a:pPr latinLnBrk="1"/>
+          <a:r>
+            <a:rPr lang="ko-KR" altLang="en-US" b="1" dirty="0"/>
+            <a:t>설정</a:t>
+          </a:r>
+          <a:endParaRPr lang="en-US" altLang="ko-KR" b="1" dirty="0"/>
+        </a:p>
+      </dgm:t>
+    </dgm:pt>
+    <dgm:pt modelId="{F2A3FC3E-9285-4898-9318-C7FFE51B1AA8}" type="parTrans" cxnId="{23AA06EF-BDA2-431F-94D7-3FB240D339EA}">
+      <dgm:prSet/>
+      <dgm:spPr/>
+      <dgm:t>
+        <a:bodyPr/>
+        <a:lstStyle/>
+        <a:p>
+          <a:pPr latinLnBrk="1"/>
+          <a:endParaRPr lang="ko-KR" altLang="en-US"/>
+        </a:p>
+      </dgm:t>
+    </dgm:pt>
+    <dgm:pt modelId="{36E219FB-09E4-4409-98DD-C65E62D9B009}" type="sibTrans" cxnId="{23AA06EF-BDA2-431F-94D7-3FB240D339EA}">
+      <dgm:prSet/>
+      <dgm:spPr>
+        <a:ln w="50800">
+          <a:solidFill>
+            <a:srgbClr val="6699FF"/>
+          </a:solidFill>
+        </a:ln>
+      </dgm:spPr>
+      <dgm:t>
+        <a:bodyPr/>
+        <a:lstStyle/>
+        <a:p>
+          <a:pPr latinLnBrk="1"/>
+          <a:endParaRPr lang="ko-KR" altLang="en-US"/>
+        </a:p>
+      </dgm:t>
+    </dgm:pt>
     <dgm:pt modelId="{602E4C1A-329F-4D9A-9A97-F09CAB0E7119}" type="pres">
       <dgm:prSet presAssocID="{BEA54F20-B0FF-40AC-AD7F-FA3A75238388}" presName="cycle" presStyleCnt="0">
         <dgm:presLayoutVars>
@@ -4731,7 +4866,7 @@
       <dgm:spPr/>
     </dgm:pt>
     <dgm:pt modelId="{53D68CD2-5DB8-407B-88EC-90CB7F14115C}" type="pres">
-      <dgm:prSet presAssocID="{47574E58-388A-4B47-B524-F0B275CC9510}" presName="node" presStyleLbl="node1" presStyleIdx="0" presStyleCnt="3" custScaleX="79200" custScaleY="125044">
+      <dgm:prSet presAssocID="{47574E58-388A-4B47-B524-F0B275CC9510}" presName="node" presStyleLbl="node1" presStyleIdx="0" presStyleCnt="4" custScaleX="79200" custScaleY="125044">
         <dgm:presLayoutVars>
           <dgm:bulletEnabled val="1"/>
         </dgm:presLayoutVars>
@@ -4747,11 +4882,31 @@
       <dgm:spPr/>
     </dgm:pt>
     <dgm:pt modelId="{8BDA4B56-3FD4-4E1E-9327-CC6678E46F13}" type="pres">
-      <dgm:prSet presAssocID="{0DE1EE65-A305-4F93-8951-6E0687D81FF9}" presName="sibTrans" presStyleLbl="sibTrans1D1" presStyleIdx="0" presStyleCnt="3"/>
+      <dgm:prSet presAssocID="{0DE1EE65-A305-4F93-8951-6E0687D81FF9}" presName="sibTrans" presStyleLbl="sibTrans1D1" presStyleIdx="0" presStyleCnt="4"/>
+      <dgm:spPr/>
+    </dgm:pt>
+    <dgm:pt modelId="{AE846717-76DA-4C82-AF5F-AD43341D7AC9}" type="pres">
+      <dgm:prSet presAssocID="{0FC3AA81-AF68-45B5-8FE9-9D1CF0CA88BC}" presName="node" presStyleLbl="node1" presStyleIdx="1" presStyleCnt="4" custScaleX="79200" custScaleY="125044">
+        <dgm:presLayoutVars>
+          <dgm:bulletEnabled val="1"/>
+        </dgm:presLayoutVars>
+      </dgm:prSet>
+      <dgm:spPr>
+        <a:prstGeom prst="ellipse">
+          <a:avLst/>
+        </a:prstGeom>
+      </dgm:spPr>
+    </dgm:pt>
+    <dgm:pt modelId="{3ED159B8-08A5-45A7-8886-427394EEB4C1}" type="pres">
+      <dgm:prSet presAssocID="{0FC3AA81-AF68-45B5-8FE9-9D1CF0CA88BC}" presName="spNode" presStyleCnt="0"/>
+      <dgm:spPr/>
+    </dgm:pt>
+    <dgm:pt modelId="{7C58D9C2-C084-4FC0-A119-125C1F1CB072}" type="pres">
+      <dgm:prSet presAssocID="{36E219FB-09E4-4409-98DD-C65E62D9B009}" presName="sibTrans" presStyleLbl="sibTrans1D1" presStyleIdx="1" presStyleCnt="4"/>
       <dgm:spPr/>
     </dgm:pt>
     <dgm:pt modelId="{5B6E4B0F-FD4C-404E-B062-C5A7502F2243}" type="pres">
-      <dgm:prSet presAssocID="{EE460914-CD3B-4D36-BEB4-16326533DE76}" presName="node" presStyleLbl="node1" presStyleIdx="1" presStyleCnt="3" custScaleX="79200" custScaleY="125044">
+      <dgm:prSet presAssocID="{EE460914-CD3B-4D36-BEB4-16326533DE76}" presName="node" presStyleLbl="node1" presStyleIdx="2" presStyleCnt="4" custScaleX="79200" custScaleY="125044">
         <dgm:presLayoutVars>
           <dgm:bulletEnabled val="1"/>
         </dgm:presLayoutVars>
@@ -4767,11 +4922,11 @@
       <dgm:spPr/>
     </dgm:pt>
     <dgm:pt modelId="{6BF56D71-9CD4-49B6-90CB-26AA4E777908}" type="pres">
-      <dgm:prSet presAssocID="{73DD9232-9D6B-4BDB-AC78-A3ADC25F1FD1}" presName="sibTrans" presStyleLbl="sibTrans1D1" presStyleIdx="1" presStyleCnt="3"/>
+      <dgm:prSet presAssocID="{73DD9232-9D6B-4BDB-AC78-A3ADC25F1FD1}" presName="sibTrans" presStyleLbl="sibTrans1D1" presStyleIdx="2" presStyleCnt="4"/>
       <dgm:spPr/>
     </dgm:pt>
     <dgm:pt modelId="{8B0AA011-AEEE-4917-AEFD-8C627E061545}" type="pres">
-      <dgm:prSet presAssocID="{B8C6C97A-86FD-41F2-BB26-F65F436F18C9}" presName="node" presStyleLbl="node1" presStyleIdx="2" presStyleCnt="3" custScaleX="79200" custScaleY="125044" custRadScaleRad="99916" custRadScaleInc="208">
+      <dgm:prSet presAssocID="{B8C6C97A-86FD-41F2-BB26-F65F436F18C9}" presName="node" presStyleLbl="node1" presStyleIdx="3" presStyleCnt="4" custScaleX="79200" custScaleY="125044" custRadScaleRad="99916" custRadScaleInc="208">
         <dgm:presLayoutVars>
           <dgm:bulletEnabled val="1"/>
         </dgm:presLayoutVars>
@@ -4787,36 +4942,42 @@
       <dgm:spPr/>
     </dgm:pt>
     <dgm:pt modelId="{92A047D5-A812-4F08-ACC0-9F57F1DF8BF5}" type="pres">
-      <dgm:prSet presAssocID="{71BDE985-3644-4AE3-A03B-A4771A6D24DC}" presName="sibTrans" presStyleLbl="sibTrans1D1" presStyleIdx="2" presStyleCnt="3"/>
+      <dgm:prSet presAssocID="{71BDE985-3644-4AE3-A03B-A4771A6D24DC}" presName="sibTrans" presStyleLbl="sibTrans1D1" presStyleIdx="3" presStyleCnt="4"/>
       <dgm:spPr/>
     </dgm:pt>
   </dgm:ptLst>
   <dgm:cxnLst>
     <dgm:cxn modelId="{BC71F901-B868-4B6B-89C2-317A5C562E5F}" type="presOf" srcId="{73DD9232-9D6B-4BDB-AC78-A3ADC25F1FD1}" destId="{6BF56D71-9CD4-49B6-90CB-26AA4E777908}" srcOrd="0" destOrd="0" presId="urn:microsoft.com/office/officeart/2005/8/layout/cycle5"/>
+    <dgm:cxn modelId="{DA259108-3EC0-4115-82A7-DD28D48364E3}" type="presOf" srcId="{0FC3AA81-AF68-45B5-8FE9-9D1CF0CA88BC}" destId="{AE846717-76DA-4C82-AF5F-AD43341D7AC9}" srcOrd="0" destOrd="0" presId="urn:microsoft.com/office/officeart/2005/8/layout/cycle5"/>
     <dgm:cxn modelId="{C7333110-E948-4987-9E0C-3C6C61A4BC10}" srcId="{BEA54F20-B0FF-40AC-AD7F-FA3A75238388}" destId="{47574E58-388A-4B47-B524-F0B275CC9510}" srcOrd="0" destOrd="0" parTransId="{CA774994-4E38-4936-BA01-39289C970451}" sibTransId="{0DE1EE65-A305-4F93-8951-6E0687D81FF9}"/>
     <dgm:cxn modelId="{7EC66B35-5107-45E4-8662-F5BA8DB50A5E}" type="presOf" srcId="{0DE1EE65-A305-4F93-8951-6E0687D81FF9}" destId="{8BDA4B56-3FD4-4E1E-9327-CC6678E46F13}" srcOrd="0" destOrd="0" presId="urn:microsoft.com/office/officeart/2005/8/layout/cycle5"/>
-    <dgm:cxn modelId="{775A4A5E-0B41-444D-8896-F1F3B52B7B89}" srcId="{BEA54F20-B0FF-40AC-AD7F-FA3A75238388}" destId="{B8C6C97A-86FD-41F2-BB26-F65F436F18C9}" srcOrd="2" destOrd="0" parTransId="{1CB14EEF-E5A0-4D83-BE8B-EFF3150CF5E2}" sibTransId="{71BDE985-3644-4AE3-A03B-A4771A6D24DC}"/>
+    <dgm:cxn modelId="{775A4A5E-0B41-444D-8896-F1F3B52B7B89}" srcId="{BEA54F20-B0FF-40AC-AD7F-FA3A75238388}" destId="{B8C6C97A-86FD-41F2-BB26-F65F436F18C9}" srcOrd="3" destOrd="0" parTransId="{1CB14EEF-E5A0-4D83-BE8B-EFF3150CF5E2}" sibTransId="{71BDE985-3644-4AE3-A03B-A4771A6D24DC}"/>
     <dgm:cxn modelId="{0A947560-D755-4D9D-B204-38A88F84D8AC}" type="presOf" srcId="{47574E58-388A-4B47-B524-F0B275CC9510}" destId="{53D68CD2-5DB8-407B-88EC-90CB7F14115C}" srcOrd="0" destOrd="0" presId="urn:microsoft.com/office/officeart/2005/8/layout/cycle5"/>
-    <dgm:cxn modelId="{0F242642-AC6A-4441-B382-86407C02367C}" srcId="{BEA54F20-B0FF-40AC-AD7F-FA3A75238388}" destId="{EE460914-CD3B-4D36-BEB4-16326533DE76}" srcOrd="1" destOrd="0" parTransId="{7D1A9F28-09FE-4C38-9671-82C239700977}" sibTransId="{73DD9232-9D6B-4BDB-AC78-A3ADC25F1FD1}"/>
+    <dgm:cxn modelId="{0F242642-AC6A-4441-B382-86407C02367C}" srcId="{BEA54F20-B0FF-40AC-AD7F-FA3A75238388}" destId="{EE460914-CD3B-4D36-BEB4-16326533DE76}" srcOrd="2" destOrd="0" parTransId="{7D1A9F28-09FE-4C38-9671-82C239700977}" sibTransId="{73DD9232-9D6B-4BDB-AC78-A3ADC25F1FD1}"/>
     <dgm:cxn modelId="{6E7BB170-1F76-4896-8A73-E7BB4D7C7B07}" type="presOf" srcId="{71BDE985-3644-4AE3-A03B-A4771A6D24DC}" destId="{92A047D5-A812-4F08-ACC0-9F57F1DF8BF5}" srcOrd="0" destOrd="0" presId="urn:microsoft.com/office/officeart/2005/8/layout/cycle5"/>
     <dgm:cxn modelId="{4D5D4EA4-D610-429F-B472-6AB092BAEE30}" type="presOf" srcId="{BEA54F20-B0FF-40AC-AD7F-FA3A75238388}" destId="{602E4C1A-329F-4D9A-9A97-F09CAB0E7119}" srcOrd="0" destOrd="0" presId="urn:microsoft.com/office/officeart/2005/8/layout/cycle5"/>
     <dgm:cxn modelId="{9D10B4CA-10BF-44FD-982A-413246A550BF}" type="presOf" srcId="{B8C6C97A-86FD-41F2-BB26-F65F436F18C9}" destId="{8B0AA011-AEEE-4917-AEFD-8C627E061545}" srcOrd="0" destOrd="0" presId="urn:microsoft.com/office/officeart/2005/8/layout/cycle5"/>
     <dgm:cxn modelId="{828A3ECE-E2AC-454A-8D1E-E03A83A676E5}" type="presOf" srcId="{EE460914-CD3B-4D36-BEB4-16326533DE76}" destId="{5B6E4B0F-FD4C-404E-B062-C5A7502F2243}" srcOrd="0" destOrd="0" presId="urn:microsoft.com/office/officeart/2005/8/layout/cycle5"/>
+    <dgm:cxn modelId="{91C364D4-1A59-4077-98FC-4EAD943EC836}" type="presOf" srcId="{36E219FB-09E4-4409-98DD-C65E62D9B009}" destId="{7C58D9C2-C084-4FC0-A119-125C1F1CB072}" srcOrd="0" destOrd="0" presId="urn:microsoft.com/office/officeart/2005/8/layout/cycle5"/>
+    <dgm:cxn modelId="{23AA06EF-BDA2-431F-94D7-3FB240D339EA}" srcId="{BEA54F20-B0FF-40AC-AD7F-FA3A75238388}" destId="{0FC3AA81-AF68-45B5-8FE9-9D1CF0CA88BC}" srcOrd="1" destOrd="0" parTransId="{F2A3FC3E-9285-4898-9318-C7FFE51B1AA8}" sibTransId="{36E219FB-09E4-4409-98DD-C65E62D9B009}"/>
     <dgm:cxn modelId="{8BF9F042-6950-4862-AA94-20EE84699759}" type="presParOf" srcId="{602E4C1A-329F-4D9A-9A97-F09CAB0E7119}" destId="{53D68CD2-5DB8-407B-88EC-90CB7F14115C}" srcOrd="0" destOrd="0" presId="urn:microsoft.com/office/officeart/2005/8/layout/cycle5"/>
     <dgm:cxn modelId="{EC9FD4DE-39F4-4414-9723-192CE929ABB1}" type="presParOf" srcId="{602E4C1A-329F-4D9A-9A97-F09CAB0E7119}" destId="{1E20E0E2-5B2C-4E18-88BC-B1EF012C3193}" srcOrd="1" destOrd="0" presId="urn:microsoft.com/office/officeart/2005/8/layout/cycle5"/>
     <dgm:cxn modelId="{0A8D5658-3454-47EC-ADE2-20836B4000A1}" type="presParOf" srcId="{602E4C1A-329F-4D9A-9A97-F09CAB0E7119}" destId="{8BDA4B56-3FD4-4E1E-9327-CC6678E46F13}" srcOrd="2" destOrd="0" presId="urn:microsoft.com/office/officeart/2005/8/layout/cycle5"/>
-    <dgm:cxn modelId="{1F5CD8CB-1525-4A18-AE3B-2351A8AD81A3}" type="presParOf" srcId="{602E4C1A-329F-4D9A-9A97-F09CAB0E7119}" destId="{5B6E4B0F-FD4C-404E-B062-C5A7502F2243}" srcOrd="3" destOrd="0" presId="urn:microsoft.com/office/officeart/2005/8/layout/cycle5"/>
-    <dgm:cxn modelId="{C82BBB96-9B95-4742-8128-504A8BCB9B45}" type="presParOf" srcId="{602E4C1A-329F-4D9A-9A97-F09CAB0E7119}" destId="{0D1D31F2-04C9-481F-AD72-9CFBC5DC0898}" srcOrd="4" destOrd="0" presId="urn:microsoft.com/office/officeart/2005/8/layout/cycle5"/>
-    <dgm:cxn modelId="{EA210F74-A687-40FB-BB21-6BA7892187D3}" type="presParOf" srcId="{602E4C1A-329F-4D9A-9A97-F09CAB0E7119}" destId="{6BF56D71-9CD4-49B6-90CB-26AA4E777908}" srcOrd="5" destOrd="0" presId="urn:microsoft.com/office/officeart/2005/8/layout/cycle5"/>
-    <dgm:cxn modelId="{B0DC4B41-8688-48E7-BA16-54BA1EA00CED}" type="presParOf" srcId="{602E4C1A-329F-4D9A-9A97-F09CAB0E7119}" destId="{8B0AA011-AEEE-4917-AEFD-8C627E061545}" srcOrd="6" destOrd="0" presId="urn:microsoft.com/office/officeart/2005/8/layout/cycle5"/>
-    <dgm:cxn modelId="{D471DE5A-96BB-4011-900E-E1FD4E3257FE}" type="presParOf" srcId="{602E4C1A-329F-4D9A-9A97-F09CAB0E7119}" destId="{383A232A-02AA-4594-B2A3-229C9BF129C4}" srcOrd="7" destOrd="0" presId="urn:microsoft.com/office/officeart/2005/8/layout/cycle5"/>
-    <dgm:cxn modelId="{ABDEB448-2F9D-419B-99C6-69294FB9D33C}" type="presParOf" srcId="{602E4C1A-329F-4D9A-9A97-F09CAB0E7119}" destId="{92A047D5-A812-4F08-ACC0-9F57F1DF8BF5}" srcOrd="8" destOrd="0" presId="urn:microsoft.com/office/officeart/2005/8/layout/cycle5"/>
+    <dgm:cxn modelId="{71D91D24-FA4C-451A-87C7-B7EF8F47EA0D}" type="presParOf" srcId="{602E4C1A-329F-4D9A-9A97-F09CAB0E7119}" destId="{AE846717-76DA-4C82-AF5F-AD43341D7AC9}" srcOrd="3" destOrd="0" presId="urn:microsoft.com/office/officeart/2005/8/layout/cycle5"/>
+    <dgm:cxn modelId="{70A30935-9671-45D2-AF0D-A250D9F9C953}" type="presParOf" srcId="{602E4C1A-329F-4D9A-9A97-F09CAB0E7119}" destId="{3ED159B8-08A5-45A7-8886-427394EEB4C1}" srcOrd="4" destOrd="0" presId="urn:microsoft.com/office/officeart/2005/8/layout/cycle5"/>
+    <dgm:cxn modelId="{7AF966C9-EA62-4EEC-AEF4-3213D70EB990}" type="presParOf" srcId="{602E4C1A-329F-4D9A-9A97-F09CAB0E7119}" destId="{7C58D9C2-C084-4FC0-A119-125C1F1CB072}" srcOrd="5" destOrd="0" presId="urn:microsoft.com/office/officeart/2005/8/layout/cycle5"/>
+    <dgm:cxn modelId="{1F5CD8CB-1525-4A18-AE3B-2351A8AD81A3}" type="presParOf" srcId="{602E4C1A-329F-4D9A-9A97-F09CAB0E7119}" destId="{5B6E4B0F-FD4C-404E-B062-C5A7502F2243}" srcOrd="6" destOrd="0" presId="urn:microsoft.com/office/officeart/2005/8/layout/cycle5"/>
+    <dgm:cxn modelId="{C82BBB96-9B95-4742-8128-504A8BCB9B45}" type="presParOf" srcId="{602E4C1A-329F-4D9A-9A97-F09CAB0E7119}" destId="{0D1D31F2-04C9-481F-AD72-9CFBC5DC0898}" srcOrd="7" destOrd="0" presId="urn:microsoft.com/office/officeart/2005/8/layout/cycle5"/>
+    <dgm:cxn modelId="{EA210F74-A687-40FB-BB21-6BA7892187D3}" type="presParOf" srcId="{602E4C1A-329F-4D9A-9A97-F09CAB0E7119}" destId="{6BF56D71-9CD4-49B6-90CB-26AA4E777908}" srcOrd="8" destOrd="0" presId="urn:microsoft.com/office/officeart/2005/8/layout/cycle5"/>
+    <dgm:cxn modelId="{B0DC4B41-8688-48E7-BA16-54BA1EA00CED}" type="presParOf" srcId="{602E4C1A-329F-4D9A-9A97-F09CAB0E7119}" destId="{8B0AA011-AEEE-4917-AEFD-8C627E061545}" srcOrd="9" destOrd="0" presId="urn:microsoft.com/office/officeart/2005/8/layout/cycle5"/>
+    <dgm:cxn modelId="{D471DE5A-96BB-4011-900E-E1FD4E3257FE}" type="presParOf" srcId="{602E4C1A-329F-4D9A-9A97-F09CAB0E7119}" destId="{383A232A-02AA-4594-B2A3-229C9BF129C4}" srcOrd="10" destOrd="0" presId="urn:microsoft.com/office/officeart/2005/8/layout/cycle5"/>
+    <dgm:cxn modelId="{ABDEB448-2F9D-419B-99C6-69294FB9D33C}" type="presParOf" srcId="{602E4C1A-329F-4D9A-9A97-F09CAB0E7119}" destId="{92A047D5-A812-4F08-ACC0-9F57F1DF8BF5}" srcOrd="11" destOrd="0" presId="urn:microsoft.com/office/officeart/2005/8/layout/cycle5"/>
   </dgm:cxnLst>
   <dgm:bg/>
   <dgm:whole/>
   <dgm:extLst>
     <a:ext uri="http://schemas.microsoft.com/office/drawing/2008/diagram">
-      <dsp:dataModelExt xmlns:dsp="http://schemas.microsoft.com/office/drawing/2008/diagram" relId="rId7" minVer="http://schemas.openxmlformats.org/drawingml/2006/diagram"/>
+      <dsp:dataModelExt xmlns:dsp="http://schemas.microsoft.com/office/drawing/2008/diagram" relId="rId6" minVer="http://schemas.openxmlformats.org/drawingml/2006/diagram"/>
     </a:ext>
   </dgm:extLst>
 </dgm:dataModel>
@@ -4837,8 +4998,8 @@
       </dsp:nvSpPr>
       <dsp:spPr>
         <a:xfrm>
-          <a:off x="3080162" y="-99277"/>
-          <a:ext cx="1967674" cy="2019316"/>
+          <a:off x="3297046" y="-157405"/>
+          <a:ext cx="1533906" cy="1574163"/>
         </a:xfrm>
         <a:prstGeom prst="ellipse">
           <a:avLst/>
@@ -4870,12 +5031,12 @@
         </a:fontRef>
       </dsp:style>
       <dsp:txBody>
-        <a:bodyPr spcFirstLastPara="0" vert="horz" wrap="square" lIns="87630" tIns="87630" rIns="87630" bIns="87630" numCol="1" spcCol="1270" anchor="ctr" anchorCtr="0">
+        <a:bodyPr spcFirstLastPara="0" vert="horz" wrap="square" lIns="64770" tIns="64770" rIns="64770" bIns="64770" numCol="1" spcCol="1270" anchor="ctr" anchorCtr="0">
           <a:noAutofit/>
         </a:bodyPr>
         <a:lstStyle/>
         <a:p>
-          <a:pPr marL="0" lvl="0" indent="0" algn="ctr" defTabSz="1022350" latinLnBrk="1">
+          <a:pPr marL="0" lvl="0" indent="0" algn="ctr" defTabSz="755650" latinLnBrk="1">
             <a:lnSpc>
               <a:spcPct val="90000"/>
             </a:lnSpc>
@@ -4888,13 +5049,13 @@
             <a:buNone/>
           </a:pPr>
           <a:r>
-            <a:rPr lang="ko-KR" altLang="en-US" sz="2300" b="1" kern="1200" dirty="0"/>
+            <a:rPr lang="ko-KR" altLang="en-US" sz="1700" b="1" kern="1200" dirty="0"/>
             <a:t>주체</a:t>
           </a:r>
-          <a:endParaRPr lang="en-US" altLang="ko-KR" sz="2300" b="1" kern="1200" dirty="0"/>
+          <a:endParaRPr lang="en-US" altLang="ko-KR" sz="1700" b="1" kern="1200" dirty="0"/>
         </a:p>
         <a:p>
-          <a:pPr marL="0" lvl="0" indent="0" algn="ctr" defTabSz="1022350" latinLnBrk="1">
+          <a:pPr marL="0" lvl="0" indent="0" algn="ctr" defTabSz="755650" latinLnBrk="1">
             <a:lnSpc>
               <a:spcPct val="90000"/>
             </a:lnSpc>
@@ -4907,14 +5068,14 @@
             <a:buNone/>
           </a:pPr>
           <a:r>
-            <a:rPr lang="ko-KR" altLang="en-US" sz="2300" b="1" kern="1200" dirty="0"/>
+            <a:rPr lang="ko-KR" altLang="en-US" sz="1700" b="1" kern="1200" dirty="0"/>
             <a:t>선택</a:t>
           </a:r>
         </a:p>
       </dsp:txBody>
       <dsp:txXfrm>
-        <a:off x="3368321" y="196445"/>
-        <a:ext cx="1391356" cy="1427872"/>
+        <a:off x="3521681" y="73126"/>
+        <a:ext cx="1084636" cy="1113101"/>
       </dsp:txXfrm>
     </dsp:sp>
     <dsp:sp modelId="{8BDA4B56-3FD4-4E1E-9327-CC6678E46F13}">
@@ -4924,8 +5085,8 @@
       </dsp:nvSpPr>
       <dsp:spPr>
         <a:xfrm>
-          <a:off x="1909284" y="910380"/>
-          <a:ext cx="4309431" cy="4309431"/>
+          <a:off x="1984342" y="629676"/>
+          <a:ext cx="4159314" cy="4159314"/>
         </a:xfrm>
         <a:custGeom>
           <a:avLst/>
@@ -4936,9 +5097,146 @@
           <a:pathLst>
             <a:path>
               <a:moveTo>
-                <a:pt x="3522953" y="490165"/>
+                <a:pt x="3138849" y="289940"/>
               </a:moveTo>
-              <a:arcTo wR="2154715" hR="2154715" stAng="18565184" swAng="2407726"/>
+              <a:arcTo wR="2079657" hR="2079657" stAng="18037077" swAng="1689975"/>
+            </a:path>
+          </a:pathLst>
+        </a:custGeom>
+        <a:noFill/>
+        <a:ln w="50800" cap="flat" cmpd="sng" algn="ctr">
+          <a:solidFill>
+            <a:srgbClr val="6699FF"/>
+          </a:solidFill>
+          <a:prstDash val="solid"/>
+          <a:miter lim="800000"/>
+          <a:tailEnd type="arrow"/>
+        </a:ln>
+        <a:effectLst/>
+      </dsp:spPr>
+      <dsp:style>
+        <a:lnRef idx="1">
+          <a:scrgbClr r="0" g="0" b="0"/>
+        </a:lnRef>
+        <a:fillRef idx="0">
+          <a:scrgbClr r="0" g="0" b="0"/>
+        </a:fillRef>
+        <a:effectRef idx="0">
+          <a:scrgbClr r="0" g="0" b="0"/>
+        </a:effectRef>
+        <a:fontRef idx="minor"/>
+      </dsp:style>
+    </dsp:sp>
+    <dsp:sp modelId="{AE846717-76DA-4C82-AF5F-AD43341D7AC9}">
+      <dsp:nvSpPr>
+        <dsp:cNvPr id="0" name=""/>
+        <dsp:cNvSpPr/>
+      </dsp:nvSpPr>
+      <dsp:spPr>
+        <a:xfrm>
+          <a:off x="5376704" y="1922251"/>
+          <a:ext cx="1533906" cy="1574163"/>
+        </a:xfrm>
+        <a:prstGeom prst="ellipse">
+          <a:avLst/>
+        </a:prstGeom>
+        <a:solidFill>
+          <a:srgbClr val="99CCFF"/>
+        </a:solidFill>
+        <a:ln w="12700" cap="flat" cmpd="sng" algn="ctr">
+          <a:solidFill>
+            <a:srgbClr val="0070C0"/>
+          </a:solidFill>
+          <a:prstDash val="solid"/>
+          <a:miter lim="800000"/>
+        </a:ln>
+        <a:effectLst/>
+      </dsp:spPr>
+      <dsp:style>
+        <a:lnRef idx="2">
+          <a:scrgbClr r="0" g="0" b="0"/>
+        </a:lnRef>
+        <a:fillRef idx="1">
+          <a:scrgbClr r="0" g="0" b="0"/>
+        </a:fillRef>
+        <a:effectRef idx="0">
+          <a:scrgbClr r="0" g="0" b="0"/>
+        </a:effectRef>
+        <a:fontRef idx="minor">
+          <a:schemeClr val="lt1"/>
+        </a:fontRef>
+      </dsp:style>
+      <dsp:txBody>
+        <a:bodyPr spcFirstLastPara="0" vert="horz" wrap="square" lIns="60960" tIns="60960" rIns="60960" bIns="60960" numCol="1" spcCol="1270" anchor="ctr" anchorCtr="0">
+          <a:noAutofit/>
+        </a:bodyPr>
+        <a:lstStyle/>
+        <a:p>
+          <a:pPr marL="0" lvl="0" indent="0" algn="ctr" defTabSz="711200" latinLnBrk="1">
+            <a:lnSpc>
+              <a:spcPct val="90000"/>
+            </a:lnSpc>
+            <a:spcBef>
+              <a:spcPct val="0"/>
+            </a:spcBef>
+            <a:spcAft>
+              <a:spcPct val="35000"/>
+            </a:spcAft>
+            <a:buNone/>
+          </a:pPr>
+          <a:r>
+            <a:rPr lang="ko-KR" altLang="en-US" sz="1600" b="1" kern="1200" dirty="0"/>
+            <a:t>목적지</a:t>
+          </a:r>
+          <a:endParaRPr lang="en-US" altLang="ko-KR" sz="1600" b="1" kern="1200" dirty="0"/>
+        </a:p>
+        <a:p>
+          <a:pPr marL="0" lvl="0" indent="0" algn="ctr" defTabSz="711200" latinLnBrk="1">
+            <a:lnSpc>
+              <a:spcPct val="90000"/>
+            </a:lnSpc>
+            <a:spcBef>
+              <a:spcPct val="0"/>
+            </a:spcBef>
+            <a:spcAft>
+              <a:spcPct val="35000"/>
+            </a:spcAft>
+            <a:buNone/>
+          </a:pPr>
+          <a:r>
+            <a:rPr lang="ko-KR" altLang="en-US" sz="1600" b="1" kern="1200" dirty="0"/>
+            <a:t>설정</a:t>
+          </a:r>
+          <a:endParaRPr lang="en-US" altLang="ko-KR" sz="1600" b="1" kern="1200" dirty="0"/>
+        </a:p>
+      </dsp:txBody>
+      <dsp:txXfrm>
+        <a:off x="5601339" y="2152782"/>
+        <a:ext cx="1084636" cy="1113101"/>
+      </dsp:txXfrm>
+    </dsp:sp>
+    <dsp:sp modelId="{7C58D9C2-C084-4FC0-A119-125C1F1CB072}">
+      <dsp:nvSpPr>
+        <dsp:cNvPr id="0" name=""/>
+        <dsp:cNvSpPr/>
+      </dsp:nvSpPr>
+      <dsp:spPr>
+        <a:xfrm>
+          <a:off x="1984342" y="629676"/>
+          <a:ext cx="4159314" cy="4159314"/>
+        </a:xfrm>
+        <a:custGeom>
+          <a:avLst/>
+          <a:gdLst/>
+          <a:ahLst/>
+          <a:cxnLst/>
+          <a:rect l="0" t="0" r="0" b="0"/>
+          <a:pathLst>
+            <a:path>
+              <a:moveTo>
+                <a:pt x="3858224" y="3157466"/>
+              </a:moveTo>
+              <a:arcTo wR="2079657" hR="2079657" stAng="1872948" swAng="1689975"/>
             </a:path>
           </a:pathLst>
         </a:custGeom>
@@ -4973,8 +5271,8 @@
       </dsp:nvSpPr>
       <dsp:spPr>
         <a:xfrm>
-          <a:off x="4946201" y="3132796"/>
-          <a:ext cx="1967674" cy="2019316"/>
+          <a:off x="3297047" y="4001909"/>
+          <a:ext cx="1533906" cy="1574163"/>
         </a:xfrm>
         <a:prstGeom prst="ellipse">
           <a:avLst/>
@@ -5006,12 +5304,12 @@
         </a:fontRef>
       </dsp:style>
       <dsp:txBody>
-        <a:bodyPr spcFirstLastPara="0" vert="horz" wrap="square" lIns="83820" tIns="83820" rIns="83820" bIns="83820" numCol="1" spcCol="1270" anchor="ctr" anchorCtr="0">
+        <a:bodyPr spcFirstLastPara="0" vert="horz" wrap="square" lIns="57150" tIns="57150" rIns="57150" bIns="57150" numCol="1" spcCol="1270" anchor="ctr" anchorCtr="0">
           <a:noAutofit/>
         </a:bodyPr>
         <a:lstStyle/>
         <a:p>
-          <a:pPr marL="0" lvl="0" indent="0" algn="ctr" defTabSz="977900" latinLnBrk="1">
+          <a:pPr marL="0" lvl="0" indent="0" algn="ctr" defTabSz="666750" latinLnBrk="1">
             <a:lnSpc>
               <a:spcPct val="90000"/>
             </a:lnSpc>
@@ -5024,13 +5322,13 @@
             <a:buNone/>
           </a:pPr>
           <a:r>
-            <a:rPr lang="ko-KR" altLang="en-US" sz="2200" b="1" kern="1200" dirty="0"/>
+            <a:rPr lang="ko-KR" altLang="en-US" sz="1500" b="1" kern="1200" dirty="0"/>
             <a:t>중력장</a:t>
           </a:r>
-          <a:endParaRPr lang="en-US" altLang="ko-KR" sz="2200" b="1" kern="1200" dirty="0"/>
+          <a:endParaRPr lang="en-US" altLang="ko-KR" sz="1500" b="1" kern="1200" dirty="0"/>
         </a:p>
         <a:p>
-          <a:pPr marL="0" lvl="0" indent="0" algn="ctr" defTabSz="977900" latinLnBrk="1">
+          <a:pPr marL="0" lvl="0" indent="0" algn="ctr" defTabSz="666750" latinLnBrk="1">
             <a:lnSpc>
               <a:spcPct val="90000"/>
             </a:lnSpc>
@@ -5043,14 +5341,14 @@
             <a:buNone/>
           </a:pPr>
           <a:r>
-            <a:rPr lang="ko-KR" altLang="en-US" sz="2200" b="1" kern="1200" dirty="0"/>
-            <a:t>설정</a:t>
+            <a:rPr lang="ko-KR" altLang="en-US" sz="1500" b="1" kern="1200" dirty="0"/>
+            <a:t>배치</a:t>
           </a:r>
         </a:p>
       </dsp:txBody>
       <dsp:txXfrm>
-        <a:off x="5234360" y="3428518"/>
-        <a:ext cx="1391356" cy="1427872"/>
+        <a:off x="3521682" y="4232440"/>
+        <a:ext cx="1084636" cy="1113101"/>
       </dsp:txXfrm>
     </dsp:sp>
     <dsp:sp modelId="{6BF56D71-9CD4-49B6-90CB-26AA4E777908}">
@@ -5060,8 +5358,8 @@
       </dsp:nvSpPr>
       <dsp:spPr>
         <a:xfrm>
-          <a:off x="1911494" y="909389"/>
-          <a:ext cx="4309431" cy="4309431"/>
+          <a:off x="1986593" y="630570"/>
+          <a:ext cx="4159314" cy="4159314"/>
         </a:xfrm>
         <a:custGeom>
           <a:avLst/>
@@ -5072,9 +5370,9 @@
           <a:pathLst>
             <a:path>
               <a:moveTo>
-                <a:pt x="2702260" y="4238701"/>
+                <a:pt x="1018224" y="3868046"/>
               </a:moveTo>
-              <a:arcTo wR="2154715" hR="2154715" stAng="4516732" swAng="1774256"/>
+              <a:arcTo wR="2079657" hR="2079657" stAng="7241381" swAng="1691007"/>
             </a:path>
           </a:pathLst>
         </a:custGeom>
@@ -5109,8 +5407,8 @@
       </dsp:nvSpPr>
       <dsp:spPr>
         <a:xfrm>
-          <a:off x="1214130" y="3129182"/>
-          <a:ext cx="1967674" cy="2019316"/>
+          <a:off x="1219137" y="1919988"/>
+          <a:ext cx="1533906" cy="1574163"/>
         </a:xfrm>
         <a:prstGeom prst="ellipse">
           <a:avLst/>
@@ -5142,12 +5440,12 @@
         </a:fontRef>
       </dsp:style>
       <dsp:txBody>
-        <a:bodyPr spcFirstLastPara="0" vert="horz" wrap="square" lIns="83820" tIns="83820" rIns="83820" bIns="83820" numCol="1" spcCol="1270" anchor="ctr" anchorCtr="0">
+        <a:bodyPr spcFirstLastPara="0" vert="horz" wrap="square" lIns="57150" tIns="57150" rIns="57150" bIns="57150" numCol="1" spcCol="1270" anchor="ctr" anchorCtr="0">
           <a:noAutofit/>
         </a:bodyPr>
         <a:lstStyle/>
         <a:p>
-          <a:pPr marL="0" lvl="0" indent="0" algn="ctr" defTabSz="977900" latinLnBrk="1">
+          <a:pPr marL="0" lvl="0" indent="0" algn="ctr" defTabSz="666750" latinLnBrk="1">
             <a:lnSpc>
               <a:spcPct val="90000"/>
             </a:lnSpc>
@@ -5160,13 +5458,13 @@
             <a:buNone/>
           </a:pPr>
           <a:r>
-            <a:rPr lang="ko-KR" altLang="en-US" sz="2200" b="1" kern="1200" dirty="0"/>
+            <a:rPr lang="ko-KR" altLang="en-US" sz="1500" b="1" kern="1200" dirty="0"/>
             <a:t>구체</a:t>
           </a:r>
-          <a:endParaRPr lang="en-US" altLang="ko-KR" sz="2200" b="1" kern="1200" dirty="0"/>
+          <a:endParaRPr lang="en-US" altLang="ko-KR" sz="1500" b="1" kern="1200" dirty="0"/>
         </a:p>
         <a:p>
-          <a:pPr marL="0" lvl="0" indent="0" algn="ctr" defTabSz="977900" latinLnBrk="1">
+          <a:pPr marL="0" lvl="0" indent="0" algn="ctr" defTabSz="666750" latinLnBrk="1">
             <a:lnSpc>
               <a:spcPct val="90000"/>
             </a:lnSpc>
@@ -5179,14 +5477,14 @@
             <a:buNone/>
           </a:pPr>
           <a:r>
-            <a:rPr lang="ko-KR" altLang="en-US" sz="2200" b="1" kern="1200" dirty="0"/>
+            <a:rPr lang="ko-KR" altLang="en-US" sz="1500" b="1" kern="1200" dirty="0"/>
             <a:t>이동</a:t>
           </a:r>
         </a:p>
       </dsp:txBody>
       <dsp:txXfrm>
-        <a:off x="1502289" y="3424904"/>
-        <a:ext cx="1391356" cy="1427872"/>
+        <a:off x="1443772" y="2150519"/>
+        <a:ext cx="1084636" cy="1113101"/>
       </dsp:txXfrm>
     </dsp:sp>
     <dsp:sp modelId="{92A047D5-A812-4F08-ACC0-9F57F1DF8BF5}">
@@ -5196,8 +5494,8 @@
       </dsp:nvSpPr>
       <dsp:spPr>
         <a:xfrm>
-          <a:off x="1911067" y="909464"/>
-          <a:ext cx="4309431" cy="4309431"/>
+          <a:off x="1986598" y="628779"/>
+          <a:ext cx="4159314" cy="4159314"/>
         </a:xfrm>
         <a:custGeom>
           <a:avLst/>
@@ -5208,9 +5506,9 @@
           <a:pathLst>
             <a:path>
               <a:moveTo>
-                <a:pt x="36095" y="1761972"/>
+                <a:pt x="301482" y="1001199"/>
               </a:moveTo>
-              <a:arcTo wR="2154715" hR="2154715" stAng="11430126" swAng="2402760"/>
+              <a:arcTo wR="2079657" hR="2079657" stAng="12674201" swAng="1685897"/>
             </a:path>
           </a:pathLst>
         </a:custGeom>
@@ -6631,7 +6929,7 @@
           <a:p>
             <a:fld id="{9EEA4200-C903-4FD2-AC1C-BAE29F20E4A4}" type="datetimeFigureOut">
               <a:rPr lang="ko-KR" altLang="en-US" smtClean="0"/>
-              <a:t>2021-12-06</a:t>
+              <a:t>2021-12-07</a:t>
             </a:fld>
             <a:endParaRPr lang="ko-KR" altLang="en-US"/>
           </a:p>
@@ -6829,7 +7127,7 @@
           <a:p>
             <a:fld id="{9EEA4200-C903-4FD2-AC1C-BAE29F20E4A4}" type="datetimeFigureOut">
               <a:rPr lang="ko-KR" altLang="en-US" smtClean="0"/>
-              <a:t>2021-12-06</a:t>
+              <a:t>2021-12-07</a:t>
             </a:fld>
             <a:endParaRPr lang="ko-KR" altLang="en-US"/>
           </a:p>
@@ -7037,7 +7335,7 @@
           <a:p>
             <a:fld id="{9EEA4200-C903-4FD2-AC1C-BAE29F20E4A4}" type="datetimeFigureOut">
               <a:rPr lang="ko-KR" altLang="en-US" smtClean="0"/>
-              <a:t>2021-12-06</a:t>
+              <a:t>2021-12-07</a:t>
             </a:fld>
             <a:endParaRPr lang="ko-KR" altLang="en-US"/>
           </a:p>
@@ -7235,7 +7533,7 @@
           <a:p>
             <a:fld id="{9EEA4200-C903-4FD2-AC1C-BAE29F20E4A4}" type="datetimeFigureOut">
               <a:rPr lang="ko-KR" altLang="en-US" smtClean="0"/>
-              <a:t>2021-12-06</a:t>
+              <a:t>2021-12-07</a:t>
             </a:fld>
             <a:endParaRPr lang="ko-KR" altLang="en-US"/>
           </a:p>
@@ -7510,7 +7808,7 @@
           <a:p>
             <a:fld id="{9EEA4200-C903-4FD2-AC1C-BAE29F20E4A4}" type="datetimeFigureOut">
               <a:rPr lang="ko-KR" altLang="en-US" smtClean="0"/>
-              <a:t>2021-12-06</a:t>
+              <a:t>2021-12-07</a:t>
             </a:fld>
             <a:endParaRPr lang="ko-KR" altLang="en-US"/>
           </a:p>
@@ -7775,7 +8073,7 @@
           <a:p>
             <a:fld id="{9EEA4200-C903-4FD2-AC1C-BAE29F20E4A4}" type="datetimeFigureOut">
               <a:rPr lang="ko-KR" altLang="en-US" smtClean="0"/>
-              <a:t>2021-12-06</a:t>
+              <a:t>2021-12-07</a:t>
             </a:fld>
             <a:endParaRPr lang="ko-KR" altLang="en-US"/>
           </a:p>
@@ -8187,7 +8485,7 @@
           <a:p>
             <a:fld id="{9EEA4200-C903-4FD2-AC1C-BAE29F20E4A4}" type="datetimeFigureOut">
               <a:rPr lang="ko-KR" altLang="en-US" smtClean="0"/>
-              <a:t>2021-12-06</a:t>
+              <a:t>2021-12-07</a:t>
             </a:fld>
             <a:endParaRPr lang="ko-KR" altLang="en-US"/>
           </a:p>
@@ -8328,7 +8626,7 @@
           <a:p>
             <a:fld id="{9EEA4200-C903-4FD2-AC1C-BAE29F20E4A4}" type="datetimeFigureOut">
               <a:rPr lang="ko-KR" altLang="en-US" smtClean="0"/>
-              <a:t>2021-12-06</a:t>
+              <a:t>2021-12-07</a:t>
             </a:fld>
             <a:endParaRPr lang="ko-KR" altLang="en-US"/>
           </a:p>
@@ -8441,7 +8739,7 @@
           <a:p>
             <a:fld id="{9EEA4200-C903-4FD2-AC1C-BAE29F20E4A4}" type="datetimeFigureOut">
               <a:rPr lang="ko-KR" altLang="en-US" smtClean="0"/>
-              <a:t>2021-12-06</a:t>
+              <a:t>2021-12-07</a:t>
             </a:fld>
             <a:endParaRPr lang="ko-KR" altLang="en-US"/>
           </a:p>
@@ -8752,7 +9050,7 @@
           <a:p>
             <a:fld id="{9EEA4200-C903-4FD2-AC1C-BAE29F20E4A4}" type="datetimeFigureOut">
               <a:rPr lang="ko-KR" altLang="en-US" smtClean="0"/>
-              <a:t>2021-12-06</a:t>
+              <a:t>2021-12-07</a:t>
             </a:fld>
             <a:endParaRPr lang="ko-KR" altLang="en-US"/>
           </a:p>
@@ -9040,7 +9338,7 @@
           <a:p>
             <a:fld id="{9EEA4200-C903-4FD2-AC1C-BAE29F20E4A4}" type="datetimeFigureOut">
               <a:rPr lang="ko-KR" altLang="en-US" smtClean="0"/>
-              <a:t>2021-12-06</a:t>
+              <a:t>2021-12-07</a:t>
             </a:fld>
             <a:endParaRPr lang="ko-KR" altLang="en-US"/>
           </a:p>
@@ -9284,7 +9582,7 @@
           <a:p>
             <a:fld id="{9EEA4200-C903-4FD2-AC1C-BAE29F20E4A4}" type="datetimeFigureOut">
               <a:rPr lang="ko-KR" altLang="en-US" smtClean="0"/>
-              <a:t>2021-12-06</a:t>
+              <a:t>2021-12-07</a:t>
             </a:fld>
             <a:endParaRPr lang="ko-KR" altLang="en-US"/>
           </a:p>
@@ -17452,10 +17750,10 @@
       </p:grpSpPr>
       <p:grpSp>
         <p:nvGrpSpPr>
-          <p:cNvPr id="3" name="그룹 2">
+          <p:cNvPr id="9" name="그룹 8">
             <a:extLst>
               <a:ext uri="{FF2B5EF4-FFF2-40B4-BE49-F238E27FC236}">
-                <a16:creationId xmlns:a16="http://schemas.microsoft.com/office/drawing/2014/main" id="{6B14CDFC-00C8-4907-9BE1-906AB8433102}"/>
+                <a16:creationId xmlns:a16="http://schemas.microsoft.com/office/drawing/2014/main" id="{AD30CA76-1101-4794-8E9F-5739A5140320}"/>
               </a:ext>
             </a:extLst>
           </p:cNvPr>
@@ -17464,12 +17762,40 @@
         </p:nvGrpSpPr>
         <p:grpSpPr>
           <a:xfrm>
-            <a:off x="1795128" y="424391"/>
+            <a:off x="1786163" y="719666"/>
             <a:ext cx="8128000" cy="5418667"/>
-            <a:chOff x="1795128" y="424391"/>
+            <a:chOff x="1786163" y="719666"/>
             <a:chExt cx="8128000" cy="5418667"/>
           </a:xfrm>
         </p:grpSpPr>
+        <p:graphicFrame>
+          <p:nvGraphicFramePr>
+            <p:cNvPr id="2" name="다이어그램 1">
+              <a:extLst>
+                <a:ext uri="{FF2B5EF4-FFF2-40B4-BE49-F238E27FC236}">
+                  <a16:creationId xmlns:a16="http://schemas.microsoft.com/office/drawing/2014/main" id="{3ED1C52E-DEEA-4E29-A43F-0FA1C28D0669}"/>
+                </a:ext>
+              </a:extLst>
+            </p:cNvPr>
+            <p:cNvGraphicFramePr/>
+            <p:nvPr>
+              <p:extLst>
+                <p:ext uri="{D42A27DB-BD31-4B8C-83A1-F6EECF244321}">
+                  <p14:modId xmlns:p14="http://schemas.microsoft.com/office/powerpoint/2010/main" val="2482284796"/>
+                </p:ext>
+              </p:extLst>
+            </p:nvPr>
+          </p:nvGraphicFramePr>
+          <p:xfrm>
+            <a:off x="1786163" y="719666"/>
+            <a:ext cx="8128000" cy="5418667"/>
+          </p:xfrm>
+          <a:graphic>
+            <a:graphicData uri="http://schemas.openxmlformats.org/drawingml/2006/diagram">
+              <dgm:relIds xmlns:dgm="http://schemas.openxmlformats.org/drawingml/2006/diagram" xmlns:r="http://schemas.openxmlformats.org/officeDocument/2006/relationships" r:dm="rId2" r:lo="rId3" r:qs="rId4" r:cs="rId5"/>
+            </a:graphicData>
+          </a:graphic>
+        </p:graphicFrame>
         <p:pic>
           <p:nvPicPr>
             <p:cNvPr id="4" name="Picture 2" descr="루프, 무한 무료 아이콘 의 Neu Interface">
@@ -17485,7 +17811,7 @@
             <p:nvPr/>
           </p:nvPicPr>
           <p:blipFill>
-            <a:blip r:embed="rId2">
+            <a:blip r:embed="rId7">
               <a:clrChange>
                 <a:clrFrom>
                   <a:srgbClr val="FFFFFF"/>
@@ -17516,7 +17842,7 @@
           </p:blipFill>
           <p:spPr bwMode="auto">
             <a:xfrm>
-              <a:off x="4787566" y="2357437"/>
+              <a:off x="4778600" y="2357436"/>
               <a:ext cx="2143125" cy="2143125"/>
             </a:xfrm>
             <a:prstGeom prst="rect">
@@ -17534,35 +17860,72 @@
             </a:extLst>
           </p:spPr>
         </p:pic>
-        <p:graphicFrame>
-          <p:nvGraphicFramePr>
-            <p:cNvPr id="2" name="다이어그램 1">
-              <a:extLst>
-                <a:ext uri="{FF2B5EF4-FFF2-40B4-BE49-F238E27FC236}">
-                  <a16:creationId xmlns:a16="http://schemas.microsoft.com/office/drawing/2014/main" id="{3ED1C52E-DEEA-4E29-A43F-0FA1C28D0669}"/>
-                </a:ext>
-              </a:extLst>
-            </p:cNvPr>
-            <p:cNvGraphicFramePr/>
-            <p:nvPr>
-              <p:extLst>
-                <p:ext uri="{D42A27DB-BD31-4B8C-83A1-F6EECF244321}">
-                  <p14:modId xmlns:p14="http://schemas.microsoft.com/office/powerpoint/2010/main" val="1541752726"/>
-                </p:ext>
-              </p:extLst>
-            </p:nvPr>
-          </p:nvGraphicFramePr>
-          <p:xfrm>
-            <a:off x="1795128" y="424391"/>
-            <a:ext cx="8128000" cy="5418667"/>
-          </p:xfrm>
-          <a:graphic>
-            <a:graphicData uri="http://schemas.openxmlformats.org/drawingml/2006/diagram">
-              <dgm:relIds xmlns:dgm="http://schemas.openxmlformats.org/drawingml/2006/diagram" xmlns:r="http://schemas.openxmlformats.org/officeDocument/2006/relationships" r:dm="rId3" r:lo="rId4" r:qs="rId5" r:cs="rId6"/>
-            </a:graphicData>
-          </a:graphic>
-        </p:graphicFrame>
       </p:grpSp>
+      <p:sp>
+        <p:nvSpPr>
+          <p:cNvPr id="8" name="TextBox 7">
+            <a:extLst>
+              <a:ext uri="{FF2B5EF4-FFF2-40B4-BE49-F238E27FC236}">
+                <a16:creationId xmlns:a16="http://schemas.microsoft.com/office/drawing/2014/main" id="{8E6EB622-5F7E-4847-BE05-93C75252A43A}"/>
+              </a:ext>
+            </a:extLst>
+          </p:cNvPr>
+          <p:cNvSpPr txBox="1"/>
+          <p:nvPr/>
+        </p:nvSpPr>
+        <p:spPr>
+          <a:xfrm>
+            <a:off x="6355977" y="1583649"/>
+            <a:ext cx="6096000" cy="1754326"/>
+          </a:xfrm>
+          <a:prstGeom prst="rect">
+            <a:avLst/>
+          </a:prstGeom>
+          <a:noFill/>
+        </p:spPr>
+        <p:txBody>
+          <a:bodyPr wrap="square">
+            <a:spAutoFit/>
+          </a:bodyPr>
+          <a:lstStyle/>
+          <a:p>
+            <a:r>
+              <a:rPr lang="ko-KR" altLang="en-US" dirty="0"/>
+              <a:t>1. 주체가 될 셀을 선택함</a:t>
+            </a:r>
+          </a:p>
+          <a:p>
+            <a:r>
+              <a:rPr lang="ko-KR" altLang="en-US" dirty="0"/>
+              <a:t>2. 주체가 될 셀에 있는 구체와 타 셀의 구체들의</a:t>
+            </a:r>
+          </a:p>
+          <a:p>
+            <a:r>
+              <a:rPr lang="ko-KR" altLang="en-US" dirty="0"/>
+              <a:t>   목적지를 설정함</a:t>
+            </a:r>
+          </a:p>
+          <a:p>
+            <a:r>
+              <a:rPr lang="ko-KR" altLang="en-US" dirty="0"/>
+              <a:t>3. 중력장 1개를 배치하는 시점에서 구체는 목적</a:t>
+            </a:r>
+          </a:p>
+          <a:p>
+            <a:r>
+              <a:rPr lang="ko-KR" altLang="en-US" dirty="0"/>
+              <a:t>   지로 움직이기 시작함</a:t>
+            </a:r>
+          </a:p>
+          <a:p>
+            <a:r>
+              <a:rPr lang="ko-KR" altLang="en-US" dirty="0"/>
+              <a:t>4. 닿을 시 탈출 완료 </a:t>
+            </a:r>
+          </a:p>
+        </p:txBody>
+      </p:sp>
     </p:spTree>
     <p:extLst>
       <p:ext uri="{BB962C8B-B14F-4D97-AF65-F5344CB8AC3E}">

</xml_diff>